<commit_message>
ppt and documentation added
</commit_message>
<xml_diff>
--- a/Documentation/Project_Presentaion.pptx
+++ b/Documentation/Project_Presentaion.pptx
@@ -5,7 +5,14 @@
     <p:sldMasterId id="2147483648" r:id="rId1"/>
   </p:sldMasterIdLst>
   <p:sldIdLst>
-    <p:sldId id="256" r:id="rId2"/>
+    <p:sldId id="3249" r:id="rId2"/>
+    <p:sldId id="256" r:id="rId3"/>
+    <p:sldId id="3251" r:id="rId4"/>
+    <p:sldId id="3252" r:id="rId5"/>
+    <p:sldId id="3253" r:id="rId6"/>
+    <p:sldId id="3254" r:id="rId7"/>
+    <p:sldId id="3255" r:id="rId8"/>
+    <p:sldId id="3256" r:id="rId9"/>
   </p:sldIdLst>
   <p:sldSz cx="12192000" cy="6858000"/>
   <p:notesSz cx="6858000" cy="9144000"/>
@@ -104,6 +111,11 @@
       </a:defRPr>
     </a:lvl9pPr>
   </p:defaultTextStyle>
+  <p:extLst>
+    <p:ext uri="{EFAFB233-063F-42B5-8137-9DF3F51BA10A}">
+      <p15:sldGuideLst xmlns:p15="http://schemas.microsoft.com/office/powerpoint/2012/main"/>
+    </p:ext>
+  </p:extLst>
 </p:presentation>
 </file>
 
@@ -157,7 +169,7 @@
           <a:noFill/>
           <a:extLst>
             <a:ext uri="{909E8E84-426E-40dd-AFC4-6F175D3DCCD1}">
-              <a14:hiddenFill xmlns:a14="http://schemas.microsoft.com/office/drawing/2010/main" xmlns="">
+              <a14:hiddenFill xmlns="" xmlns:a14="http://schemas.microsoft.com/office/drawing/2010/main">
                 <a:solidFill>
                   <a:srgbClr val="FFFFFF"/>
                 </a:solidFill>
@@ -217,7 +229,7 @@
             </a:ln>
             <a:extLst>
               <a:ext uri="{91240B29-F687-4f45-9708-019B960494DF}">
-                <a14:hiddenLine xmlns:a14="http://schemas.microsoft.com/office/drawing/2010/main" xmlns="" w="9525">
+                <a14:hiddenLine xmlns="" xmlns:a14="http://schemas.microsoft.com/office/drawing/2010/main" w="9525">
                   <a:solidFill>
                     <a:srgbClr val="000000"/>
                   </a:solidFill>
@@ -307,7 +319,7 @@
             </a:ln>
             <a:extLst>
               <a:ext uri="{91240B29-F687-4f45-9708-019B960494DF}">
-                <a14:hiddenLine xmlns:a14="http://schemas.microsoft.com/office/drawing/2010/main" xmlns="" w="9525">
+                <a14:hiddenLine xmlns="" xmlns:a14="http://schemas.microsoft.com/office/drawing/2010/main" w="9525">
                   <a:solidFill>
                     <a:srgbClr val="000000"/>
                   </a:solidFill>
@@ -397,7 +409,7 @@
             </a:ln>
             <a:extLst>
               <a:ext uri="{91240B29-F687-4f45-9708-019B960494DF}">
-                <a14:hiddenLine xmlns:a14="http://schemas.microsoft.com/office/drawing/2010/main" xmlns="" w="9525">
+                <a14:hiddenLine xmlns="" xmlns:a14="http://schemas.microsoft.com/office/drawing/2010/main" w="9525">
                   <a:solidFill>
                     <a:srgbClr val="000000"/>
                   </a:solidFill>
@@ -431,7 +443,7 @@
             </a:ln>
             <a:extLst>
               <a:ext uri="{91240B29-F687-4f45-9708-019B960494DF}">
-                <a14:hiddenLine xmlns:a14="http://schemas.microsoft.com/office/drawing/2010/main" xmlns="" w="9525">
+                <a14:hiddenLine xmlns="" xmlns:a14="http://schemas.microsoft.com/office/drawing/2010/main" w="9525">
                   <a:solidFill>
                     <a:srgbClr val="000000"/>
                   </a:solidFill>
@@ -521,7 +533,7 @@
             </a:ln>
             <a:extLst>
               <a:ext uri="{91240B29-F687-4f45-9708-019B960494DF}">
-                <a14:hiddenLine xmlns:a14="http://schemas.microsoft.com/office/drawing/2010/main" xmlns="" w="9525">
+                <a14:hiddenLine xmlns="" xmlns:a14="http://schemas.microsoft.com/office/drawing/2010/main" w="9525">
                   <a:solidFill>
                     <a:srgbClr val="000000"/>
                   </a:solidFill>
@@ -583,7 +595,7 @@
             </a:ln>
             <a:extLst>
               <a:ext uri="{91240B29-F687-4f45-9708-019B960494DF}">
-                <a14:hiddenLine xmlns:a14="http://schemas.microsoft.com/office/drawing/2010/main" xmlns="" w="9525">
+                <a14:hiddenLine xmlns="" xmlns:a14="http://schemas.microsoft.com/office/drawing/2010/main" w="9525">
                   <a:solidFill>
                     <a:srgbClr val="000000"/>
                   </a:solidFill>
@@ -645,7 +657,7 @@
             </a:ln>
             <a:extLst>
               <a:ext uri="{91240B29-F687-4f45-9708-019B960494DF}">
-                <a14:hiddenLine xmlns:a14="http://schemas.microsoft.com/office/drawing/2010/main" xmlns="" w="9525">
+                <a14:hiddenLine xmlns="" xmlns:a14="http://schemas.microsoft.com/office/drawing/2010/main" w="9525">
                   <a:solidFill>
                     <a:srgbClr val="000000"/>
                   </a:solidFill>
@@ -735,7 +747,7 @@
             </a:ln>
             <a:extLst>
               <a:ext uri="{91240B29-F687-4f45-9708-019B960494DF}">
-                <a14:hiddenLine xmlns:a14="http://schemas.microsoft.com/office/drawing/2010/main" xmlns="" w="9525">
+                <a14:hiddenLine xmlns="" xmlns:a14="http://schemas.microsoft.com/office/drawing/2010/main" w="9525">
                   <a:solidFill>
                     <a:srgbClr val="000000"/>
                   </a:solidFill>
@@ -797,7 +809,7 @@
             </a:ln>
             <a:extLst>
               <a:ext uri="{91240B29-F687-4f45-9708-019B960494DF}">
-                <a14:hiddenLine xmlns:a14="http://schemas.microsoft.com/office/drawing/2010/main" xmlns="" w="9525">
+                <a14:hiddenLine xmlns="" xmlns:a14="http://schemas.microsoft.com/office/drawing/2010/main" w="9525">
                   <a:solidFill>
                     <a:srgbClr val="000000"/>
                   </a:solidFill>
@@ -859,7 +871,7 @@
             </a:ln>
             <a:extLst>
               <a:ext uri="{91240B29-F687-4f45-9708-019B960494DF}">
-                <a14:hiddenLine xmlns:a14="http://schemas.microsoft.com/office/drawing/2010/main" xmlns="" w="9525">
+                <a14:hiddenLine xmlns="" xmlns:a14="http://schemas.microsoft.com/office/drawing/2010/main" w="9525">
                   <a:solidFill>
                     <a:srgbClr val="000000"/>
                   </a:solidFill>
@@ -949,7 +961,7 @@
             </a:ln>
             <a:extLst>
               <a:ext uri="{91240B29-F687-4f45-9708-019B960494DF}">
-                <a14:hiddenLine xmlns:a14="http://schemas.microsoft.com/office/drawing/2010/main" xmlns="" w="9525">
+                <a14:hiddenLine xmlns="" xmlns:a14="http://schemas.microsoft.com/office/drawing/2010/main" w="9525">
                   <a:solidFill>
                     <a:srgbClr val="000000"/>
                   </a:solidFill>
@@ -1039,7 +1051,7 @@
             </a:ln>
             <a:extLst>
               <a:ext uri="{91240B29-F687-4f45-9708-019B960494DF}">
-                <a14:hiddenLine xmlns:a14="http://schemas.microsoft.com/office/drawing/2010/main" xmlns="" w="9525">
+                <a14:hiddenLine xmlns="" xmlns:a14="http://schemas.microsoft.com/office/drawing/2010/main" w="9525">
                   <a:solidFill>
                     <a:srgbClr val="000000"/>
                   </a:solidFill>
@@ -1101,7 +1113,7 @@
             </a:ln>
             <a:extLst>
               <a:ext uri="{91240B29-F687-4f45-9708-019B960494DF}">
-                <a14:hiddenLine xmlns:a14="http://schemas.microsoft.com/office/drawing/2010/main" xmlns="" w="9525">
+                <a14:hiddenLine xmlns="" xmlns:a14="http://schemas.microsoft.com/office/drawing/2010/main" w="9525">
                   <a:solidFill>
                     <a:srgbClr val="000000"/>
                   </a:solidFill>
@@ -1211,7 +1223,7 @@
             </a:ln>
             <a:extLst>
               <a:ext uri="{91240B29-F687-4f45-9708-019B960494DF}">
-                <a14:hiddenLine xmlns:a14="http://schemas.microsoft.com/office/drawing/2010/main" xmlns="" w="9525">
+                <a14:hiddenLine xmlns="" xmlns:a14="http://schemas.microsoft.com/office/drawing/2010/main" w="9525">
                   <a:solidFill>
                     <a:srgbClr val="000000"/>
                   </a:solidFill>
@@ -1273,7 +1285,7 @@
             </a:ln>
             <a:extLst>
               <a:ext uri="{91240B29-F687-4f45-9708-019B960494DF}">
-                <a14:hiddenLine xmlns:a14="http://schemas.microsoft.com/office/drawing/2010/main" xmlns="" w="9525">
+                <a14:hiddenLine xmlns="" xmlns:a14="http://schemas.microsoft.com/office/drawing/2010/main" w="9525">
                   <a:solidFill>
                     <a:srgbClr val="000000"/>
                   </a:solidFill>
@@ -1363,7 +1375,7 @@
             </a:ln>
             <a:extLst>
               <a:ext uri="{91240B29-F687-4f45-9708-019B960494DF}">
-                <a14:hiddenLine xmlns:a14="http://schemas.microsoft.com/office/drawing/2010/main" xmlns="" w="9525">
+                <a14:hiddenLine xmlns="" xmlns:a14="http://schemas.microsoft.com/office/drawing/2010/main" w="9525">
                   <a:solidFill>
                     <a:srgbClr val="000000"/>
                   </a:solidFill>
@@ -1453,7 +1465,7 @@
             </a:ln>
             <a:extLst>
               <a:ext uri="{91240B29-F687-4f45-9708-019B960494DF}">
-                <a14:hiddenLine xmlns:a14="http://schemas.microsoft.com/office/drawing/2010/main" xmlns="" w="9525">
+                <a14:hiddenLine xmlns="" xmlns:a14="http://schemas.microsoft.com/office/drawing/2010/main" w="9525">
                   <a:solidFill>
                     <a:srgbClr val="000000"/>
                   </a:solidFill>
@@ -1515,7 +1527,7 @@
             </a:ln>
             <a:extLst>
               <a:ext uri="{91240B29-F687-4f45-9708-019B960494DF}">
-                <a14:hiddenLine xmlns:a14="http://schemas.microsoft.com/office/drawing/2010/main" xmlns="" w="9525">
+                <a14:hiddenLine xmlns="" xmlns:a14="http://schemas.microsoft.com/office/drawing/2010/main" w="9525">
                   <a:solidFill>
                     <a:srgbClr val="000000"/>
                   </a:solidFill>
@@ -1605,7 +1617,7 @@
             </a:ln>
             <a:extLst>
               <a:ext uri="{91240B29-F687-4f45-9708-019B960494DF}">
-                <a14:hiddenLine xmlns:a14="http://schemas.microsoft.com/office/drawing/2010/main" xmlns="" w="9525">
+                <a14:hiddenLine xmlns="" xmlns:a14="http://schemas.microsoft.com/office/drawing/2010/main" w="9525">
                   <a:solidFill>
                     <a:srgbClr val="000000"/>
                   </a:solidFill>
@@ -1695,7 +1707,7 @@
             </a:ln>
             <a:extLst>
               <a:ext uri="{91240B29-F687-4f45-9708-019B960494DF}">
-                <a14:hiddenLine xmlns:a14="http://schemas.microsoft.com/office/drawing/2010/main" xmlns="" w="9525">
+                <a14:hiddenLine xmlns="" xmlns:a14="http://schemas.microsoft.com/office/drawing/2010/main" w="9525">
                   <a:solidFill>
                     <a:srgbClr val="000000"/>
                   </a:solidFill>
@@ -1751,7 +1763,7 @@
             </a:ln>
             <a:extLst>
               <a:ext uri="{91240B29-F687-4f45-9708-019B960494DF}">
-                <a14:hiddenLine xmlns:a14="http://schemas.microsoft.com/office/drawing/2010/main" xmlns="" w="9525">
+                <a14:hiddenLine xmlns="" xmlns:a14="http://schemas.microsoft.com/office/drawing/2010/main" w="9525">
                   <a:solidFill>
                     <a:srgbClr val="000000"/>
                   </a:solidFill>
@@ -1841,7 +1853,7 @@
             </a:ln>
             <a:extLst>
               <a:ext uri="{91240B29-F687-4f45-9708-019B960494DF}">
-                <a14:hiddenLine xmlns:a14="http://schemas.microsoft.com/office/drawing/2010/main" xmlns="" w="9525">
+                <a14:hiddenLine xmlns="" xmlns:a14="http://schemas.microsoft.com/office/drawing/2010/main" w="9525">
                   <a:solidFill>
                     <a:srgbClr val="000000"/>
                   </a:solidFill>
@@ -1897,7 +1909,7 @@
             </a:ln>
             <a:extLst>
               <a:ext uri="{91240B29-F687-4f45-9708-019B960494DF}">
-                <a14:hiddenLine xmlns:a14="http://schemas.microsoft.com/office/drawing/2010/main" xmlns="" w="9525">
+                <a14:hiddenLine xmlns="" xmlns:a14="http://schemas.microsoft.com/office/drawing/2010/main" w="9525">
                   <a:solidFill>
                     <a:srgbClr val="000000"/>
                   </a:solidFill>
@@ -1987,7 +1999,7 @@
             </a:ln>
             <a:extLst>
               <a:ext uri="{91240B29-F687-4f45-9708-019B960494DF}">
-                <a14:hiddenLine xmlns:a14="http://schemas.microsoft.com/office/drawing/2010/main" xmlns="" w="9525">
+                <a14:hiddenLine xmlns="" xmlns:a14="http://schemas.microsoft.com/office/drawing/2010/main" w="9525">
                   <a:solidFill>
                     <a:srgbClr val="000000"/>
                   </a:solidFill>
@@ -2055,7 +2067,7 @@
             </a:ln>
             <a:extLst>
               <a:ext uri="{91240B29-F687-4f45-9708-019B960494DF}">
-                <a14:hiddenLine xmlns:a14="http://schemas.microsoft.com/office/drawing/2010/main" xmlns="" w="9525">
+                <a14:hiddenLine xmlns="" xmlns:a14="http://schemas.microsoft.com/office/drawing/2010/main" w="9525">
                   <a:solidFill>
                     <a:srgbClr val="000000"/>
                   </a:solidFill>
@@ -2145,7 +2157,7 @@
             </a:ln>
             <a:extLst>
               <a:ext uri="{91240B29-F687-4f45-9708-019B960494DF}">
-                <a14:hiddenLine xmlns:a14="http://schemas.microsoft.com/office/drawing/2010/main" xmlns="" w="9525">
+                <a14:hiddenLine xmlns="" xmlns:a14="http://schemas.microsoft.com/office/drawing/2010/main" w="9525">
                   <a:solidFill>
                     <a:srgbClr val="000000"/>
                   </a:solidFill>
@@ -2213,7 +2225,7 @@
             </a:ln>
             <a:extLst>
               <a:ext uri="{91240B29-F687-4f45-9708-019B960494DF}">
-                <a14:hiddenLine xmlns:a14="http://schemas.microsoft.com/office/drawing/2010/main" xmlns="" w="9525">
+                <a14:hiddenLine xmlns="" xmlns:a14="http://schemas.microsoft.com/office/drawing/2010/main" w="9525">
                   <a:solidFill>
                     <a:srgbClr val="000000"/>
                   </a:solidFill>
@@ -2303,7 +2315,7 @@
             </a:ln>
             <a:extLst>
               <a:ext uri="{91240B29-F687-4f45-9708-019B960494DF}">
-                <a14:hiddenLine xmlns:a14="http://schemas.microsoft.com/office/drawing/2010/main" xmlns="" w="9525">
+                <a14:hiddenLine xmlns="" xmlns:a14="http://schemas.microsoft.com/office/drawing/2010/main" w="9525">
                   <a:solidFill>
                     <a:srgbClr val="000000"/>
                   </a:solidFill>
@@ -2337,7 +2349,7 @@
             </a:ln>
             <a:extLst>
               <a:ext uri="{91240B29-F687-4f45-9708-019B960494DF}">
-                <a14:hiddenLine xmlns:a14="http://schemas.microsoft.com/office/drawing/2010/main" xmlns="" w="9525">
+                <a14:hiddenLine xmlns="" xmlns:a14="http://schemas.microsoft.com/office/drawing/2010/main" w="9525">
                   <a:solidFill>
                     <a:srgbClr val="000000"/>
                   </a:solidFill>
@@ -2427,7 +2439,7 @@
             </a:ln>
             <a:extLst>
               <a:ext uri="{91240B29-F687-4f45-9708-019B960494DF}">
-                <a14:hiddenLine xmlns:a14="http://schemas.microsoft.com/office/drawing/2010/main" xmlns="" w="9525">
+                <a14:hiddenLine xmlns="" xmlns:a14="http://schemas.microsoft.com/office/drawing/2010/main" w="9525">
                   <a:solidFill>
                     <a:srgbClr val="000000"/>
                   </a:solidFill>
@@ -2489,7 +2501,7 @@
             </a:ln>
             <a:extLst>
               <a:ext uri="{91240B29-F687-4f45-9708-019B960494DF}">
-                <a14:hiddenLine xmlns:a14="http://schemas.microsoft.com/office/drawing/2010/main" xmlns="" w="9525">
+                <a14:hiddenLine xmlns="" xmlns:a14="http://schemas.microsoft.com/office/drawing/2010/main" w="9525">
                   <a:solidFill>
                     <a:srgbClr val="000000"/>
                   </a:solidFill>
@@ -2551,7 +2563,7 @@
             </a:ln>
             <a:extLst>
               <a:ext uri="{91240B29-F687-4f45-9708-019B960494DF}">
-                <a14:hiddenLine xmlns:a14="http://schemas.microsoft.com/office/drawing/2010/main" xmlns="" w="9525">
+                <a14:hiddenLine xmlns="" xmlns:a14="http://schemas.microsoft.com/office/drawing/2010/main" w="9525">
                   <a:solidFill>
                     <a:srgbClr val="000000"/>
                   </a:solidFill>
@@ -2641,7 +2653,7 @@
             </a:ln>
             <a:extLst>
               <a:ext uri="{91240B29-F687-4f45-9708-019B960494DF}">
-                <a14:hiddenLine xmlns:a14="http://schemas.microsoft.com/office/drawing/2010/main" xmlns="" w="9525">
+                <a14:hiddenLine xmlns="" xmlns:a14="http://schemas.microsoft.com/office/drawing/2010/main" w="9525">
                   <a:solidFill>
                     <a:srgbClr val="000000"/>
                   </a:solidFill>
@@ -2709,7 +2721,7 @@
             </a:ln>
             <a:extLst>
               <a:ext uri="{91240B29-F687-4f45-9708-019B960494DF}">
-                <a14:hiddenLine xmlns:a14="http://schemas.microsoft.com/office/drawing/2010/main" xmlns="" w="9525">
+                <a14:hiddenLine xmlns="" xmlns:a14="http://schemas.microsoft.com/office/drawing/2010/main" w="9525">
                   <a:solidFill>
                     <a:srgbClr val="000000"/>
                   </a:solidFill>
@@ -2771,7 +2783,7 @@
             </a:ln>
             <a:extLst>
               <a:ext uri="{91240B29-F687-4f45-9708-019B960494DF}">
-                <a14:hiddenLine xmlns:a14="http://schemas.microsoft.com/office/drawing/2010/main" xmlns="" w="9525">
+                <a14:hiddenLine xmlns="" xmlns:a14="http://schemas.microsoft.com/office/drawing/2010/main" w="9525">
                   <a:solidFill>
                     <a:srgbClr val="000000"/>
                   </a:solidFill>
@@ -2861,7 +2873,7 @@
             </a:ln>
             <a:extLst>
               <a:ext uri="{91240B29-F687-4f45-9708-019B960494DF}">
-                <a14:hiddenLine xmlns:a14="http://schemas.microsoft.com/office/drawing/2010/main" xmlns="" w="9525">
+                <a14:hiddenLine xmlns="" xmlns:a14="http://schemas.microsoft.com/office/drawing/2010/main" w="9525">
                   <a:solidFill>
                     <a:srgbClr val="000000"/>
                   </a:solidFill>
@@ -2923,7 +2935,7 @@
             </a:ln>
             <a:extLst>
               <a:ext uri="{91240B29-F687-4f45-9708-019B960494DF}">
-                <a14:hiddenLine xmlns:a14="http://schemas.microsoft.com/office/drawing/2010/main" xmlns="" w="9525">
+                <a14:hiddenLine xmlns="" xmlns:a14="http://schemas.microsoft.com/office/drawing/2010/main" w="9525">
                   <a:solidFill>
                     <a:srgbClr val="000000"/>
                   </a:solidFill>
@@ -3013,7 +3025,7 @@
             </a:ln>
             <a:extLst>
               <a:ext uri="{91240B29-F687-4f45-9708-019B960494DF}">
-                <a14:hiddenLine xmlns:a14="http://schemas.microsoft.com/office/drawing/2010/main" xmlns="" w="9525">
+                <a14:hiddenLine xmlns="" xmlns:a14="http://schemas.microsoft.com/office/drawing/2010/main" w="9525">
                   <a:solidFill>
                     <a:srgbClr val="000000"/>
                   </a:solidFill>
@@ -3075,7 +3087,7 @@
             </a:ln>
             <a:extLst>
               <a:ext uri="{91240B29-F687-4f45-9708-019B960494DF}">
-                <a14:hiddenLine xmlns:a14="http://schemas.microsoft.com/office/drawing/2010/main" xmlns="" w="9525">
+                <a14:hiddenLine xmlns="" xmlns:a14="http://schemas.microsoft.com/office/drawing/2010/main" w="9525">
                   <a:solidFill>
                     <a:srgbClr val="000000"/>
                   </a:solidFill>
@@ -3165,7 +3177,7 @@
             </a:ln>
             <a:extLst>
               <a:ext uri="{91240B29-F687-4f45-9708-019B960494DF}">
-                <a14:hiddenLine xmlns:a14="http://schemas.microsoft.com/office/drawing/2010/main" xmlns="" w="9525">
+                <a14:hiddenLine xmlns="" xmlns:a14="http://schemas.microsoft.com/office/drawing/2010/main" w="9525">
                   <a:solidFill>
                     <a:srgbClr val="000000"/>
                   </a:solidFill>
@@ -3199,7 +3211,7 @@
             </a:ln>
             <a:extLst>
               <a:ext uri="{91240B29-F687-4f45-9708-019B960494DF}">
-                <a14:hiddenLine xmlns:a14="http://schemas.microsoft.com/office/drawing/2010/main" xmlns="" w="9525">
+                <a14:hiddenLine xmlns="" xmlns:a14="http://schemas.microsoft.com/office/drawing/2010/main" w="9525">
                   <a:solidFill>
                     <a:srgbClr val="000000"/>
                   </a:solidFill>
@@ -3264,7 +3276,7 @@
             </a:ln>
             <a:extLst>
               <a:ext uri="{91240B29-F687-4f45-9708-019B960494DF}">
-                <a14:hiddenLine xmlns:a14="http://schemas.microsoft.com/office/drawing/2010/main" xmlns="" w="9525">
+                <a14:hiddenLine xmlns="" xmlns:a14="http://schemas.microsoft.com/office/drawing/2010/main" w="9525">
                   <a:solidFill>
                     <a:srgbClr val="000000"/>
                   </a:solidFill>
@@ -3354,7 +3366,7 @@
             </a:ln>
             <a:extLst>
               <a:ext uri="{91240B29-F687-4f45-9708-019B960494DF}">
-                <a14:hiddenLine xmlns:a14="http://schemas.microsoft.com/office/drawing/2010/main" xmlns="" w="9525">
+                <a14:hiddenLine xmlns="" xmlns:a14="http://schemas.microsoft.com/office/drawing/2010/main" w="9525">
                   <a:solidFill>
                     <a:srgbClr val="000000"/>
                   </a:solidFill>
@@ -3416,7 +3428,7 @@
             </a:ln>
             <a:extLst>
               <a:ext uri="{91240B29-F687-4f45-9708-019B960494DF}">
-                <a14:hiddenLine xmlns:a14="http://schemas.microsoft.com/office/drawing/2010/main" xmlns="" w="9525">
+                <a14:hiddenLine xmlns="" xmlns:a14="http://schemas.microsoft.com/office/drawing/2010/main" w="9525">
                   <a:solidFill>
                     <a:srgbClr val="000000"/>
                   </a:solidFill>
@@ -3506,7 +3518,7 @@
             </a:ln>
             <a:extLst>
               <a:ext uri="{91240B29-F687-4f45-9708-019B960494DF}">
-                <a14:hiddenLine xmlns:a14="http://schemas.microsoft.com/office/drawing/2010/main" xmlns="" w="9525">
+                <a14:hiddenLine xmlns="" xmlns:a14="http://schemas.microsoft.com/office/drawing/2010/main" w="9525">
                   <a:solidFill>
                     <a:srgbClr val="000000"/>
                   </a:solidFill>
@@ -3596,7 +3608,7 @@
             </a:ln>
             <a:extLst>
               <a:ext uri="{91240B29-F687-4f45-9708-019B960494DF}">
-                <a14:hiddenLine xmlns:a14="http://schemas.microsoft.com/office/drawing/2010/main" xmlns="" w="9525">
+                <a14:hiddenLine xmlns="" xmlns:a14="http://schemas.microsoft.com/office/drawing/2010/main" w="9525">
                   <a:solidFill>
                     <a:srgbClr val="000000"/>
                   </a:solidFill>
@@ -3661,7 +3673,7 @@
             </a:ln>
             <a:extLst>
               <a:ext uri="{91240B29-F687-4f45-9708-019B960494DF}">
-                <a14:hiddenLine xmlns:a14="http://schemas.microsoft.com/office/drawing/2010/main" xmlns="" w="9525">
+                <a14:hiddenLine xmlns="" xmlns:a14="http://schemas.microsoft.com/office/drawing/2010/main" w="9525">
                   <a:solidFill>
                     <a:srgbClr val="000000"/>
                   </a:solidFill>
@@ -3723,7 +3735,7 @@
             </a:ln>
             <a:extLst>
               <a:ext uri="{91240B29-F687-4f45-9708-019B960494DF}">
-                <a14:hiddenLine xmlns:a14="http://schemas.microsoft.com/office/drawing/2010/main" xmlns="" w="9525">
+                <a14:hiddenLine xmlns="" xmlns:a14="http://schemas.microsoft.com/office/drawing/2010/main" w="9525">
                   <a:solidFill>
                     <a:srgbClr val="000000"/>
                   </a:solidFill>
@@ -3813,7 +3825,7 @@
             </a:ln>
             <a:extLst>
               <a:ext uri="{91240B29-F687-4f45-9708-019B960494DF}">
-                <a14:hiddenLine xmlns:a14="http://schemas.microsoft.com/office/drawing/2010/main" xmlns="" w="9525">
+                <a14:hiddenLine xmlns="" xmlns:a14="http://schemas.microsoft.com/office/drawing/2010/main" w="9525">
                   <a:solidFill>
                     <a:srgbClr val="000000"/>
                   </a:solidFill>
@@ -3903,7 +3915,7 @@
             </a:ln>
             <a:extLst>
               <a:ext uri="{91240B29-F687-4f45-9708-019B960494DF}">
-                <a14:hiddenLine xmlns:a14="http://schemas.microsoft.com/office/drawing/2010/main" xmlns="" w="9525">
+                <a14:hiddenLine xmlns="" xmlns:a14="http://schemas.microsoft.com/office/drawing/2010/main" w="9525">
                   <a:solidFill>
                     <a:srgbClr val="000000"/>
                   </a:solidFill>
@@ -3965,7 +3977,7 @@
             </a:ln>
             <a:extLst>
               <a:ext uri="{91240B29-F687-4f45-9708-019B960494DF}">
-                <a14:hiddenLine xmlns:a14="http://schemas.microsoft.com/office/drawing/2010/main" xmlns="" w="9525">
+                <a14:hiddenLine xmlns="" xmlns:a14="http://schemas.microsoft.com/office/drawing/2010/main" w="9525">
                   <a:solidFill>
                     <a:srgbClr val="000000"/>
                   </a:solidFill>
@@ -4085,7 +4097,7 @@
             </a:ln>
             <a:extLst>
               <a:ext uri="{91240B29-F687-4f45-9708-019B960494DF}">
-                <a14:hiddenLine xmlns:a14="http://schemas.microsoft.com/office/drawing/2010/main" xmlns="" w="9525">
+                <a14:hiddenLine xmlns="" xmlns:a14="http://schemas.microsoft.com/office/drawing/2010/main" w="9525">
                   <a:solidFill>
                     <a:srgbClr val="000000"/>
                   </a:solidFill>
@@ -4153,7 +4165,7 @@
             </a:ln>
             <a:extLst>
               <a:ext uri="{91240B29-F687-4f45-9708-019B960494DF}">
-                <a14:hiddenLine xmlns:a14="http://schemas.microsoft.com/office/drawing/2010/main" xmlns="" w="9525">
+                <a14:hiddenLine xmlns="" xmlns:a14="http://schemas.microsoft.com/office/drawing/2010/main" w="9525">
                   <a:solidFill>
                     <a:srgbClr val="000000"/>
                   </a:solidFill>
@@ -4243,7 +4255,7 @@
             </a:ln>
             <a:extLst>
               <a:ext uri="{91240B29-F687-4f45-9708-019B960494DF}">
-                <a14:hiddenLine xmlns:a14="http://schemas.microsoft.com/office/drawing/2010/main" xmlns="" w="9525">
+                <a14:hiddenLine xmlns="" xmlns:a14="http://schemas.microsoft.com/office/drawing/2010/main" w="9525">
                   <a:solidFill>
                     <a:srgbClr val="000000"/>
                   </a:solidFill>
@@ -7175,6 +7187,499 @@
 </p:sldLayout>
 </file>
 
+<file path=ppt/slideLayouts/slideLayout18.xml><?xml version="1.0" encoding="utf-8"?>
+<p:sldLayout xmlns:a="http://schemas.openxmlformats.org/drawingml/2006/main" xmlns:r="http://schemas.openxmlformats.org/officeDocument/2006/relationships" xmlns:p="http://schemas.openxmlformats.org/presentationml/2006/main" userDrawn="1">
+  <p:cSld name="Top picture, 2 Title and Content">
+    <p:spTree>
+      <p:nvGrpSpPr>
+        <p:cNvPr id="1" name=""/>
+        <p:cNvGrpSpPr/>
+        <p:nvPr/>
+      </p:nvGrpSpPr>
+      <p:grpSpPr>
+        <a:xfrm>
+          <a:off x="0" y="0"/>
+          <a:ext cx="0" cy="0"/>
+          <a:chOff x="0" y="0"/>
+          <a:chExt cx="0" cy="0"/>
+        </a:xfrm>
+      </p:grpSpPr>
+      <p:sp>
+        <p:nvSpPr>
+          <p:cNvPr id="8" name="Picture Placeholder 2">
+            <a:extLst>
+              <a:ext uri="{FF2B5EF4-FFF2-40B4-BE49-F238E27FC236}">
+                <a16:creationId xmlns:a16="http://schemas.microsoft.com/office/drawing/2014/main" id="{DFB68184-CA1A-5240-886F-1684FEC22093}"/>
+              </a:ext>
+            </a:extLst>
+          </p:cNvPr>
+          <p:cNvSpPr>
+            <a:spLocks noGrp="1" noChangeAspect="1"/>
+          </p:cNvSpPr>
+          <p:nvPr>
+            <p:ph type="pic" idx="14"/>
+          </p:nvPr>
+        </p:nvSpPr>
+        <p:spPr>
+          <a:xfrm>
+            <a:off x="0" y="1"/>
+            <a:ext cx="12192000" cy="4217775"/>
+          </a:xfrm>
+          <a:solidFill>
+            <a:srgbClr val="E0DED8"/>
+          </a:solidFill>
+        </p:spPr>
+        <p:txBody>
+          <a:bodyPr anchor="t"/>
+          <a:lstStyle>
+            <a:lvl1pPr marL="0" indent="0" algn="ctr">
+              <a:buNone/>
+              <a:defRPr sz="3200"/>
+            </a:lvl1pPr>
+            <a:lvl2pPr marL="457189" indent="0">
+              <a:buNone/>
+              <a:defRPr sz="2800"/>
+            </a:lvl2pPr>
+            <a:lvl3pPr marL="914377" indent="0">
+              <a:buNone/>
+              <a:defRPr sz="2400"/>
+            </a:lvl3pPr>
+            <a:lvl4pPr marL="1371566" indent="0">
+              <a:buNone/>
+              <a:defRPr sz="2000"/>
+            </a:lvl4pPr>
+            <a:lvl5pPr marL="1828754" indent="0">
+              <a:buNone/>
+              <a:defRPr sz="2000"/>
+            </a:lvl5pPr>
+            <a:lvl6pPr marL="2285943" indent="0">
+              <a:buNone/>
+              <a:defRPr sz="2000"/>
+            </a:lvl6pPr>
+            <a:lvl7pPr marL="2743131" indent="0">
+              <a:buNone/>
+              <a:defRPr sz="2000"/>
+            </a:lvl7pPr>
+            <a:lvl8pPr marL="3200320" indent="0">
+              <a:buNone/>
+              <a:defRPr sz="2000"/>
+            </a:lvl8pPr>
+            <a:lvl9pPr marL="3657509" indent="0">
+              <a:buNone/>
+              <a:defRPr sz="2000"/>
+            </a:lvl9pPr>
+          </a:lstStyle>
+          <a:p>
+            <a:r>
+              <a:rPr lang="en-US" noProof="0"/>
+              <a:t>Click icon to add picture</a:t>
+            </a:r>
+            <a:endParaRPr lang="en-GB" noProof="0"/>
+          </a:p>
+        </p:txBody>
+      </p:sp>
+      <p:sp>
+        <p:nvSpPr>
+          <p:cNvPr id="2" name="Title 1"/>
+          <p:cNvSpPr>
+            <a:spLocks noGrp="1"/>
+          </p:cNvSpPr>
+          <p:nvPr>
+            <p:ph type="title"/>
+          </p:nvPr>
+        </p:nvSpPr>
+        <p:spPr>
+          <a:xfrm>
+            <a:off x="768352" y="1024128"/>
+            <a:ext cx="4533752" cy="932264"/>
+          </a:xfrm>
+        </p:spPr>
+        <p:txBody>
+          <a:bodyPr/>
+          <a:lstStyle>
+            <a:lvl1pPr>
+              <a:defRPr>
+                <a:solidFill>
+                  <a:schemeClr val="bg2"/>
+                </a:solidFill>
+              </a:defRPr>
+            </a:lvl1pPr>
+          </a:lstStyle>
+          <a:p>
+            <a:r>
+              <a:rPr lang="en-US" noProof="0"/>
+              <a:t>Click to edit Master title style</a:t>
+            </a:r>
+            <a:endParaRPr lang="en-GB" noProof="0"/>
+          </a:p>
+        </p:txBody>
+      </p:sp>
+      <p:sp>
+        <p:nvSpPr>
+          <p:cNvPr id="11" name="Content Placeholder 2">
+            <a:extLst>
+              <a:ext uri="{FF2B5EF4-FFF2-40B4-BE49-F238E27FC236}">
+                <a16:creationId xmlns:a16="http://schemas.microsoft.com/office/drawing/2014/main" id="{87DEEAA0-107A-CB4C-9D52-4CEE5A94FA6B}"/>
+              </a:ext>
+            </a:extLst>
+          </p:cNvPr>
+          <p:cNvSpPr>
+            <a:spLocks noGrp="1"/>
+          </p:cNvSpPr>
+          <p:nvPr>
+            <p:ph idx="16" hasCustomPrompt="1"/>
+          </p:nvPr>
+        </p:nvSpPr>
+        <p:spPr>
+          <a:xfrm>
+            <a:off x="768352" y="1970569"/>
+            <a:ext cx="4543877" cy="764395"/>
+          </a:xfrm>
+        </p:spPr>
+        <p:txBody>
+          <a:bodyPr rIns="0"/>
+          <a:lstStyle>
+            <a:lvl1pPr marL="0" indent="0">
+              <a:buFontTx/>
+              <a:buNone/>
+              <a:defRPr sz="1867" b="0">
+                <a:solidFill>
+                  <a:schemeClr val="bg2"/>
+                </a:solidFill>
+              </a:defRPr>
+            </a:lvl1pPr>
+            <a:lvl2pPr marL="0" indent="0">
+              <a:buFontTx/>
+              <a:buNone/>
+              <a:defRPr sz="1867" b="0">
+                <a:solidFill>
+                  <a:schemeClr val="bg2"/>
+                </a:solidFill>
+              </a:defRPr>
+            </a:lvl2pPr>
+            <a:lvl3pPr>
+              <a:defRPr sz="1467"/>
+            </a:lvl3pPr>
+            <a:lvl4pPr>
+              <a:defRPr sz="1467"/>
+            </a:lvl4pPr>
+            <a:lvl5pPr>
+              <a:defRPr sz="1467"/>
+            </a:lvl5pPr>
+          </a:lstStyle>
+          <a:p>
+            <a:pPr lvl="0"/>
+            <a:r>
+              <a:rPr lang="en-GB" noProof="0"/>
+              <a:t>Click to add text</a:t>
+            </a:r>
+          </a:p>
+          <a:p>
+            <a:pPr lvl="1"/>
+            <a:r>
+              <a:rPr lang="en-GB" noProof="0"/>
+              <a:t>Second level</a:t>
+            </a:r>
+          </a:p>
+        </p:txBody>
+      </p:sp>
+      <p:sp>
+        <p:nvSpPr>
+          <p:cNvPr id="39" name="Content Placeholder 2">
+            <a:extLst>
+              <a:ext uri="{FF2B5EF4-FFF2-40B4-BE49-F238E27FC236}">
+                <a16:creationId xmlns:a16="http://schemas.microsoft.com/office/drawing/2014/main" id="{F4C72636-DEB4-D344-93A7-3770612C3218}"/>
+              </a:ext>
+            </a:extLst>
+          </p:cNvPr>
+          <p:cNvSpPr>
+            <a:spLocks noGrp="1"/>
+          </p:cNvSpPr>
+          <p:nvPr>
+            <p:ph idx="18" hasCustomPrompt="1"/>
+          </p:nvPr>
+        </p:nvSpPr>
+        <p:spPr>
+          <a:xfrm>
+            <a:off x="6190047" y="740835"/>
+            <a:ext cx="5233604" cy="5376333"/>
+          </a:xfrm>
+          <a:solidFill>
+            <a:schemeClr val="tx1"/>
+          </a:solidFill>
+        </p:spPr>
+        <p:txBody>
+          <a:bodyPr lIns="251999" tIns="251999" rIns="324000" bIns="251999"/>
+          <a:lstStyle>
+            <a:lvl1pPr marL="0" indent="0">
+              <a:spcAft>
+                <a:spcPts val="1000"/>
+              </a:spcAft>
+              <a:buFontTx/>
+              <a:buNone/>
+              <a:defRPr sz="1867">
+                <a:solidFill>
+                  <a:schemeClr val="bg2"/>
+                </a:solidFill>
+              </a:defRPr>
+            </a:lvl1pPr>
+            <a:lvl2pPr marL="0" indent="0">
+              <a:buFontTx/>
+              <a:buNone/>
+              <a:defRPr sz="1600" baseline="0">
+                <a:solidFill>
+                  <a:schemeClr val="bg2"/>
+                </a:solidFill>
+              </a:defRPr>
+            </a:lvl2pPr>
+            <a:lvl3pPr marL="228594" indent="-228594">
+              <a:buFont typeface="Arial" panose="020B0604020202020204" pitchFamily="34" charset="0"/>
+              <a:buChar char="•"/>
+              <a:defRPr sz="1600">
+                <a:solidFill>
+                  <a:schemeClr val="bg2"/>
+                </a:solidFill>
+              </a:defRPr>
+            </a:lvl3pPr>
+            <a:lvl4pPr marL="460788">
+              <a:defRPr sz="1600">
+                <a:solidFill>
+                  <a:schemeClr val="bg2"/>
+                </a:solidFill>
+              </a:defRPr>
+            </a:lvl4pPr>
+            <a:lvl5pPr marL="691183">
+              <a:defRPr sz="1600">
+                <a:solidFill>
+                  <a:schemeClr val="bg2"/>
+                </a:solidFill>
+              </a:defRPr>
+            </a:lvl5pPr>
+          </a:lstStyle>
+          <a:p>
+            <a:pPr lvl="0"/>
+            <a:r>
+              <a:rPr lang="en-GB" noProof="0"/>
+              <a:t>Click to add text. </a:t>
+            </a:r>
+            <a:br>
+              <a:rPr lang="en-GB" noProof="0"/>
+            </a:br>
+            <a:r>
+              <a:rPr lang="en-GB" noProof="0"/>
+              <a:t>Use ”Increase List Level” and ”Decrease List Level” buttons to change list levels (Home/Paragraph)</a:t>
+            </a:r>
+            <a:br>
+              <a:rPr lang="en-GB" noProof="0"/>
+            </a:br>
+            <a:r>
+              <a:rPr lang="en-GB" noProof="0"/>
+              <a:t>Do not use tab keys or Bullets button.</a:t>
+            </a:r>
+          </a:p>
+          <a:p>
+            <a:pPr lvl="0"/>
+            <a:r>
+              <a:rPr lang="fi-FI" noProof="0"/>
+              <a:t>First level</a:t>
+            </a:r>
+          </a:p>
+          <a:p>
+            <a:pPr lvl="1"/>
+            <a:r>
+              <a:rPr lang="fi-FI" noProof="0"/>
+              <a:t>Second level</a:t>
+            </a:r>
+          </a:p>
+          <a:p>
+            <a:pPr lvl="2"/>
+            <a:r>
+              <a:rPr lang="fi-FI" noProof="0"/>
+              <a:t>Third level</a:t>
+            </a:r>
+          </a:p>
+          <a:p>
+            <a:pPr lvl="3"/>
+            <a:r>
+              <a:rPr lang="fi-FI" noProof="0"/>
+              <a:t>Forth level</a:t>
+            </a:r>
+          </a:p>
+          <a:p>
+            <a:pPr lvl="4"/>
+            <a:r>
+              <a:rPr lang="fi-FI" noProof="0"/>
+              <a:t>Fifth level</a:t>
+            </a:r>
+          </a:p>
+        </p:txBody>
+      </p:sp>
+      <p:sp>
+        <p:nvSpPr>
+          <p:cNvPr id="4" name="Footer Placeholder 3"/>
+          <p:cNvSpPr>
+            <a:spLocks noGrp="1"/>
+          </p:cNvSpPr>
+          <p:nvPr>
+            <p:ph type="ftr" sz="quarter" idx="11"/>
+          </p:nvPr>
+        </p:nvSpPr>
+        <p:spPr/>
+        <p:txBody>
+          <a:bodyPr/>
+          <a:lstStyle/>
+          <a:p>
+            <a:r>
+              <a:rPr lang="en-GB" err="1"/>
+              <a:t>TietoEVRY</a:t>
+            </a:r>
+            <a:r>
+              <a:rPr lang="en-GB"/>
+              <a:t> </a:t>
+            </a:r>
+            <a:r>
+              <a:rPr lang="en-GB" noProof="0"/>
+              <a:t>Confidential</a:t>
+            </a:r>
+          </a:p>
+        </p:txBody>
+      </p:sp>
+      <p:sp>
+        <p:nvSpPr>
+          <p:cNvPr id="5" name="Slide Number Placeholder 4"/>
+          <p:cNvSpPr>
+            <a:spLocks noGrp="1"/>
+          </p:cNvSpPr>
+          <p:nvPr>
+            <p:ph type="sldNum" sz="quarter" idx="12"/>
+          </p:nvPr>
+        </p:nvSpPr>
+        <p:spPr/>
+        <p:txBody>
+          <a:bodyPr/>
+          <a:lstStyle/>
+          <a:p>
+            <a:fld id="{3644D4AD-7034-5E45-AAAE-D685B84B781D}" type="slidenum">
+              <a:rPr lang="en-GB" noProof="0" smtClean="0"/>
+              <a:t>‹#›</a:t>
+            </a:fld>
+            <a:endParaRPr lang="en-GB" noProof="0"/>
+          </a:p>
+        </p:txBody>
+      </p:sp>
+      <p:sp>
+        <p:nvSpPr>
+          <p:cNvPr id="10" name="Text Placeholder 6" title="Logo"/>
+          <p:cNvSpPr>
+            <a:spLocks noGrp="1"/>
+          </p:cNvSpPr>
+          <p:nvPr>
+            <p:ph type="body" sz="quarter" idx="22" hasCustomPrompt="1"/>
+          </p:nvPr>
+        </p:nvSpPr>
+        <p:spPr>
+          <a:xfrm>
+            <a:off x="172800" y="158400"/>
+            <a:ext cx="758400" cy="187200"/>
+          </a:xfrm>
+          <a:blipFill dpi="0" rotWithShape="1">
+            <a:blip r:embed="rId2" cstate="print">
+              <a:extLst>
+                <a:ext uri="{28A0092B-C50C-407E-A947-70E740481C1C}">
+                  <a14:useLocalDpi xmlns:a14="http://schemas.microsoft.com/office/drawing/2010/main"/>
+                </a:ext>
+              </a:extLst>
+            </a:blip>
+            <a:srcRect/>
+            <a:stretch>
+              <a:fillRect/>
+            </a:stretch>
+          </a:blipFill>
+        </p:spPr>
+        <p:txBody>
+          <a:bodyPr rIns="0"/>
+          <a:lstStyle>
+            <a:lvl1pPr marL="0" indent="0">
+              <a:buFontTx/>
+              <a:buNone/>
+              <a:defRPr sz="133">
+                <a:solidFill>
+                  <a:srgbClr val="E6E6E6"/>
+                </a:solidFill>
+              </a:defRPr>
+            </a:lvl1pPr>
+            <a:lvl2pPr marL="457189" indent="0">
+              <a:buFontTx/>
+              <a:buNone/>
+              <a:defRPr sz="1067">
+                <a:solidFill>
+                  <a:schemeClr val="bg2"/>
+                </a:solidFill>
+              </a:defRPr>
+            </a:lvl2pPr>
+            <a:lvl3pPr marL="914377" indent="0">
+              <a:buFontTx/>
+              <a:buNone/>
+              <a:defRPr sz="1067">
+                <a:solidFill>
+                  <a:schemeClr val="bg2"/>
+                </a:solidFill>
+              </a:defRPr>
+            </a:lvl3pPr>
+            <a:lvl4pPr marL="1371566" indent="0">
+              <a:buFontTx/>
+              <a:buNone/>
+              <a:defRPr sz="1067">
+                <a:solidFill>
+                  <a:schemeClr val="bg2"/>
+                </a:solidFill>
+              </a:defRPr>
+            </a:lvl4pPr>
+            <a:lvl5pPr marL="1828754" indent="0">
+              <a:buFontTx/>
+              <a:buNone/>
+              <a:defRPr sz="1067">
+                <a:solidFill>
+                  <a:schemeClr val="bg2"/>
+                </a:solidFill>
+              </a:defRPr>
+            </a:lvl5pPr>
+          </a:lstStyle>
+          <a:p>
+            <a:pPr lvl="0"/>
+            <a:r>
+              <a:rPr lang="fi-FI"/>
+              <a:t> </a:t>
+            </a:r>
+            <a:endParaRPr lang="en-GB"/>
+          </a:p>
+        </p:txBody>
+      </p:sp>
+    </p:spTree>
+    <p:extLst>
+      <p:ext uri="{BB962C8B-B14F-4D97-AF65-F5344CB8AC3E}">
+        <p14:creationId xmlns:p14="http://schemas.microsoft.com/office/powerpoint/2010/main" val="302073932"/>
+      </p:ext>
+    </p:extLst>
+  </p:cSld>
+  <p:clrMapOvr>
+    <a:masterClrMapping/>
+  </p:clrMapOvr>
+  <mc:AlternateContent xmlns:mc="http://schemas.openxmlformats.org/markup-compatibility/2006" xmlns:p14="http://schemas.microsoft.com/office/powerpoint/2010/main">
+    <mc:Choice Requires="p14">
+      <p:transition spd="med" p14:dur="700">
+        <p:fade/>
+      </p:transition>
+    </mc:Choice>
+    <mc:Fallback xmlns="">
+      <p:transition spd="med">
+        <p:fade/>
+      </p:transition>
+    </mc:Fallback>
+  </mc:AlternateContent>
+</p:sldLayout>
+</file>
+
 <file path=ppt/slideLayouts/slideLayout2.xml><?xml version="1.0" encoding="utf-8"?>
 <p:sldLayout xmlns:a="http://schemas.openxmlformats.org/drawingml/2006/main" xmlns:r="http://schemas.openxmlformats.org/officeDocument/2006/relationships" xmlns:p="http://schemas.openxmlformats.org/presentationml/2006/main" type="obj" preserve="1">
   <p:cSld name="Title and Content">
@@ -8941,7 +9446,7 @@
           <p:nvPr/>
         </p:nvPicPr>
         <p:blipFill>
-          <a:blip r:embed="rId19">
+          <a:blip r:embed="rId20">
             <a:alphaModFix amt="30000"/>
             <a:extLst>
               <a:ext uri="{28A0092B-C50C-407E-A947-70E740481C1C}">
@@ -8965,7 +9470,7 @@
           <a:noFill/>
           <a:extLst>
             <a:ext uri="{909E8E84-426E-40dd-AFC4-6F175D3DCCD1}">
-              <a14:hiddenFill xmlns:a14="http://schemas.microsoft.com/office/drawing/2010/main" xmlns="">
+              <a14:hiddenFill xmlns="" xmlns:a14="http://schemas.microsoft.com/office/drawing/2010/main">
                 <a:solidFill>
                   <a:srgbClr val="FFFFFF"/>
                 </a:solidFill>
@@ -9039,7 +9544,7 @@
               </a:ln>
               <a:extLst>
                 <a:ext uri="{91240B29-F687-4f45-9708-019B960494DF}">
-                  <a14:hiddenLine xmlns:a14="http://schemas.microsoft.com/office/drawing/2010/main" xmlns="" w="9525">
+                  <a14:hiddenLine xmlns="" xmlns:a14="http://schemas.microsoft.com/office/drawing/2010/main" w="9525">
                     <a:solidFill>
                       <a:srgbClr val="000000"/>
                     </a:solidFill>
@@ -9129,7 +9634,7 @@
               </a:ln>
               <a:extLst>
                 <a:ext uri="{91240B29-F687-4f45-9708-019B960494DF}">
-                  <a14:hiddenLine xmlns:a14="http://schemas.microsoft.com/office/drawing/2010/main" xmlns="" w="9525">
+                  <a14:hiddenLine xmlns="" xmlns:a14="http://schemas.microsoft.com/office/drawing/2010/main" w="9525">
                     <a:solidFill>
                       <a:srgbClr val="000000"/>
                     </a:solidFill>
@@ -9219,7 +9724,7 @@
               </a:ln>
               <a:extLst>
                 <a:ext uri="{91240B29-F687-4f45-9708-019B960494DF}">
-                  <a14:hiddenLine xmlns:a14="http://schemas.microsoft.com/office/drawing/2010/main" xmlns="" w="9525">
+                  <a14:hiddenLine xmlns="" xmlns:a14="http://schemas.microsoft.com/office/drawing/2010/main" w="9525">
                     <a:solidFill>
                       <a:srgbClr val="000000"/>
                     </a:solidFill>
@@ -9281,7 +9786,7 @@
               </a:ln>
               <a:extLst>
                 <a:ext uri="{91240B29-F687-4f45-9708-019B960494DF}">
-                  <a14:hiddenLine xmlns:a14="http://schemas.microsoft.com/office/drawing/2010/main" xmlns="" w="9525">
+                  <a14:hiddenLine xmlns="" xmlns:a14="http://schemas.microsoft.com/office/drawing/2010/main" w="9525">
                     <a:solidFill>
                       <a:srgbClr val="000000"/>
                     </a:solidFill>
@@ -9371,7 +9876,7 @@
               </a:ln>
               <a:extLst>
                 <a:ext uri="{91240B29-F687-4f45-9708-019B960494DF}">
-                  <a14:hiddenLine xmlns:a14="http://schemas.microsoft.com/office/drawing/2010/main" xmlns="" w="9525">
+                  <a14:hiddenLine xmlns="" xmlns:a14="http://schemas.microsoft.com/office/drawing/2010/main" w="9525">
                     <a:solidFill>
                       <a:srgbClr val="000000"/>
                     </a:solidFill>
@@ -9433,7 +9938,7 @@
               </a:ln>
               <a:extLst>
                 <a:ext uri="{91240B29-F687-4f45-9708-019B960494DF}">
-                  <a14:hiddenLine xmlns:a14="http://schemas.microsoft.com/office/drawing/2010/main" xmlns="" w="9525">
+                  <a14:hiddenLine xmlns="" xmlns:a14="http://schemas.microsoft.com/office/drawing/2010/main" w="9525">
                     <a:solidFill>
                       <a:srgbClr val="000000"/>
                     </a:solidFill>
@@ -9495,7 +10000,7 @@
               </a:ln>
               <a:extLst>
                 <a:ext uri="{91240B29-F687-4f45-9708-019B960494DF}">
-                  <a14:hiddenLine xmlns:a14="http://schemas.microsoft.com/office/drawing/2010/main" xmlns="" w="9525">
+                  <a14:hiddenLine xmlns="" xmlns:a14="http://schemas.microsoft.com/office/drawing/2010/main" w="9525">
                     <a:solidFill>
                       <a:srgbClr val="000000"/>
                     </a:solidFill>
@@ -9585,7 +10090,7 @@
               </a:ln>
               <a:extLst>
                 <a:ext uri="{91240B29-F687-4f45-9708-019B960494DF}">
-                  <a14:hiddenLine xmlns:a14="http://schemas.microsoft.com/office/drawing/2010/main" xmlns="" w="9525">
+                  <a14:hiddenLine xmlns="" xmlns:a14="http://schemas.microsoft.com/office/drawing/2010/main" w="9525">
                     <a:solidFill>
                       <a:srgbClr val="000000"/>
                     </a:solidFill>
@@ -9675,7 +10180,7 @@
               </a:ln>
               <a:extLst>
                 <a:ext uri="{91240B29-F687-4f45-9708-019B960494DF}">
-                  <a14:hiddenLine xmlns:a14="http://schemas.microsoft.com/office/drawing/2010/main" xmlns="" w="9525">
+                  <a14:hiddenLine xmlns="" xmlns:a14="http://schemas.microsoft.com/office/drawing/2010/main" w="9525">
                     <a:solidFill>
                       <a:srgbClr val="000000"/>
                     </a:solidFill>
@@ -9737,7 +10242,7 @@
               </a:ln>
               <a:extLst>
                 <a:ext uri="{91240B29-F687-4f45-9708-019B960494DF}">
-                  <a14:hiddenLine xmlns:a14="http://schemas.microsoft.com/office/drawing/2010/main" xmlns="" w="9525">
+                  <a14:hiddenLine xmlns="" xmlns:a14="http://schemas.microsoft.com/office/drawing/2010/main" w="9525">
                     <a:solidFill>
                       <a:srgbClr val="000000"/>
                     </a:solidFill>
@@ -9847,7 +10352,7 @@
               </a:ln>
               <a:extLst>
                 <a:ext uri="{91240B29-F687-4f45-9708-019B960494DF}">
-                  <a14:hiddenLine xmlns:a14="http://schemas.microsoft.com/office/drawing/2010/main" xmlns="" w="9525">
+                  <a14:hiddenLine xmlns="" xmlns:a14="http://schemas.microsoft.com/office/drawing/2010/main" w="9525">
                     <a:solidFill>
                       <a:srgbClr val="000000"/>
                     </a:solidFill>
@@ -9931,7 +10436,7 @@
               </a:ln>
               <a:extLst>
                 <a:ext uri="{91240B29-F687-4f45-9708-019B960494DF}">
-                  <a14:hiddenLine xmlns:a14="http://schemas.microsoft.com/office/drawing/2010/main" xmlns="" w="9525">
+                  <a14:hiddenLine xmlns="" xmlns:a14="http://schemas.microsoft.com/office/drawing/2010/main" w="9525">
                     <a:solidFill>
                       <a:srgbClr val="000000"/>
                     </a:solidFill>
@@ -9993,7 +10498,7 @@
               </a:ln>
               <a:extLst>
                 <a:ext uri="{91240B29-F687-4f45-9708-019B960494DF}">
-                  <a14:hiddenLine xmlns:a14="http://schemas.microsoft.com/office/drawing/2010/main" xmlns="" w="9525">
+                  <a14:hiddenLine xmlns="" xmlns:a14="http://schemas.microsoft.com/office/drawing/2010/main" w="9525">
                     <a:solidFill>
                       <a:srgbClr val="000000"/>
                     </a:solidFill>
@@ -10055,7 +10560,7 @@
               </a:ln>
               <a:extLst>
                 <a:ext uri="{91240B29-F687-4f45-9708-019B960494DF}">
-                  <a14:hiddenLine xmlns:a14="http://schemas.microsoft.com/office/drawing/2010/main" xmlns="" w="9525">
+                  <a14:hiddenLine xmlns="" xmlns:a14="http://schemas.microsoft.com/office/drawing/2010/main" w="9525">
                     <a:solidFill>
                       <a:srgbClr val="000000"/>
                     </a:solidFill>
@@ -10145,7 +10650,7 @@
               </a:ln>
               <a:extLst>
                 <a:ext uri="{91240B29-F687-4f45-9708-019B960494DF}">
-                  <a14:hiddenLine xmlns:a14="http://schemas.microsoft.com/office/drawing/2010/main" xmlns="" w="9525">
+                  <a14:hiddenLine xmlns="" xmlns:a14="http://schemas.microsoft.com/office/drawing/2010/main" w="9525">
                     <a:solidFill>
                       <a:srgbClr val="000000"/>
                     </a:solidFill>
@@ -10179,7 +10684,7 @@
               </a:ln>
               <a:extLst>
                 <a:ext uri="{91240B29-F687-4f45-9708-019B960494DF}">
-                  <a14:hiddenLine xmlns:a14="http://schemas.microsoft.com/office/drawing/2010/main" xmlns="" w="9525">
+                  <a14:hiddenLine xmlns="" xmlns:a14="http://schemas.microsoft.com/office/drawing/2010/main" w="9525">
                     <a:solidFill>
                       <a:srgbClr val="000000"/>
                     </a:solidFill>
@@ -10244,7 +10749,7 @@
               </a:ln>
               <a:extLst>
                 <a:ext uri="{91240B29-F687-4f45-9708-019B960494DF}">
-                  <a14:hiddenLine xmlns:a14="http://schemas.microsoft.com/office/drawing/2010/main" xmlns="" w="9525">
+                  <a14:hiddenLine xmlns="" xmlns:a14="http://schemas.microsoft.com/office/drawing/2010/main" w="9525">
                     <a:solidFill>
                       <a:srgbClr val="000000"/>
                     </a:solidFill>
@@ -10334,7 +10839,7 @@
               </a:ln>
               <a:extLst>
                 <a:ext uri="{91240B29-F687-4f45-9708-019B960494DF}">
-                  <a14:hiddenLine xmlns:a14="http://schemas.microsoft.com/office/drawing/2010/main" xmlns="" w="9525">
+                  <a14:hiddenLine xmlns="" xmlns:a14="http://schemas.microsoft.com/office/drawing/2010/main" w="9525">
                     <a:solidFill>
                       <a:srgbClr val="000000"/>
                     </a:solidFill>
@@ -10396,7 +10901,7 @@
               </a:ln>
               <a:extLst>
                 <a:ext uri="{91240B29-F687-4f45-9708-019B960494DF}">
-                  <a14:hiddenLine xmlns:a14="http://schemas.microsoft.com/office/drawing/2010/main" xmlns="" w="9525">
+                  <a14:hiddenLine xmlns="" xmlns:a14="http://schemas.microsoft.com/office/drawing/2010/main" w="9525">
                     <a:solidFill>
                       <a:srgbClr val="000000"/>
                     </a:solidFill>
@@ -10486,7 +10991,7 @@
               </a:ln>
               <a:extLst>
                 <a:ext uri="{91240B29-F687-4f45-9708-019B960494DF}">
-                  <a14:hiddenLine xmlns:a14="http://schemas.microsoft.com/office/drawing/2010/main" xmlns="" w="9525">
+                  <a14:hiddenLine xmlns="" xmlns:a14="http://schemas.microsoft.com/office/drawing/2010/main" w="9525">
                     <a:solidFill>
                       <a:srgbClr val="000000"/>
                     </a:solidFill>
@@ -10551,7 +11056,7 @@
               </a:ln>
               <a:extLst>
                 <a:ext uri="{91240B29-F687-4f45-9708-019B960494DF}">
-                  <a14:hiddenLine xmlns:a14="http://schemas.microsoft.com/office/drawing/2010/main" xmlns="" w="9525">
+                  <a14:hiddenLine xmlns="" xmlns:a14="http://schemas.microsoft.com/office/drawing/2010/main" w="9525">
                     <a:solidFill>
                       <a:srgbClr val="000000"/>
                     </a:solidFill>
@@ -10613,7 +11118,7 @@
               </a:ln>
               <a:extLst>
                 <a:ext uri="{91240B29-F687-4f45-9708-019B960494DF}">
-                  <a14:hiddenLine xmlns:a14="http://schemas.microsoft.com/office/drawing/2010/main" xmlns="" w="9525">
+                  <a14:hiddenLine xmlns="" xmlns:a14="http://schemas.microsoft.com/office/drawing/2010/main" w="9525">
                     <a:solidFill>
                       <a:srgbClr val="000000"/>
                     </a:solidFill>
@@ -10703,7 +11208,7 @@
               </a:ln>
               <a:extLst>
                 <a:ext uri="{91240B29-F687-4f45-9708-019B960494DF}">
-                  <a14:hiddenLine xmlns:a14="http://schemas.microsoft.com/office/drawing/2010/main" xmlns="" w="9525">
+                  <a14:hiddenLine xmlns="" xmlns:a14="http://schemas.microsoft.com/office/drawing/2010/main" w="9525">
                     <a:solidFill>
                       <a:srgbClr val="000000"/>
                     </a:solidFill>
@@ -10793,7 +11298,7 @@
               </a:ln>
               <a:extLst>
                 <a:ext uri="{91240B29-F687-4f45-9708-019B960494DF}">
-                  <a14:hiddenLine xmlns:a14="http://schemas.microsoft.com/office/drawing/2010/main" xmlns="" w="9525">
+                  <a14:hiddenLine xmlns="" xmlns:a14="http://schemas.microsoft.com/office/drawing/2010/main" w="9525">
                     <a:solidFill>
                       <a:srgbClr val="000000"/>
                     </a:solidFill>
@@ -10858,7 +11363,7 @@
               </a:ln>
               <a:extLst>
                 <a:ext uri="{91240B29-F687-4f45-9708-019B960494DF}">
-                  <a14:hiddenLine xmlns:a14="http://schemas.microsoft.com/office/drawing/2010/main" xmlns="" w="9525">
+                  <a14:hiddenLine xmlns="" xmlns:a14="http://schemas.microsoft.com/office/drawing/2010/main" w="9525">
                     <a:solidFill>
                       <a:srgbClr val="000000"/>
                     </a:solidFill>
@@ -10978,7 +11483,7 @@
               </a:ln>
               <a:extLst>
                 <a:ext uri="{91240B29-F687-4f45-9708-019B960494DF}">
-                  <a14:hiddenLine xmlns:a14="http://schemas.microsoft.com/office/drawing/2010/main" xmlns="" w="9525">
+                  <a14:hiddenLine xmlns="" xmlns:a14="http://schemas.microsoft.com/office/drawing/2010/main" w="9525">
                     <a:solidFill>
                       <a:srgbClr val="000000"/>
                     </a:solidFill>
@@ -11076,7 +11581,7 @@
               </a:ln>
               <a:extLst>
                 <a:ext uri="{91240B29-F687-4f45-9708-019B960494DF}">
-                  <a14:hiddenLine xmlns:a14="http://schemas.microsoft.com/office/drawing/2010/main" xmlns="" w="9525">
+                  <a14:hiddenLine xmlns="" xmlns:a14="http://schemas.microsoft.com/office/drawing/2010/main" w="9525">
                     <a:solidFill>
                       <a:srgbClr val="000000"/>
                     </a:solidFill>
@@ -11191,7 +11696,7 @@
               </a:ln>
               <a:extLst>
                 <a:ext uri="{91240B29-F687-4f45-9708-019B960494DF}">
-                  <a14:hiddenLine xmlns:a14="http://schemas.microsoft.com/office/drawing/2010/main" xmlns="" w="9525">
+                  <a14:hiddenLine xmlns="" xmlns:a14="http://schemas.microsoft.com/office/drawing/2010/main" w="9525">
                     <a:solidFill>
                       <a:srgbClr val="000000"/>
                     </a:solidFill>
@@ -11281,7 +11786,7 @@
               </a:ln>
               <a:extLst>
                 <a:ext uri="{91240B29-F687-4f45-9708-019B960494DF}">
-                  <a14:hiddenLine xmlns:a14="http://schemas.microsoft.com/office/drawing/2010/main" xmlns="" w="9525">
+                  <a14:hiddenLine xmlns="" xmlns:a14="http://schemas.microsoft.com/office/drawing/2010/main" w="9525">
                     <a:solidFill>
                       <a:srgbClr val="000000"/>
                     </a:solidFill>
@@ -11346,7 +11851,7 @@
               </a:ln>
               <a:extLst>
                 <a:ext uri="{91240B29-F687-4f45-9708-019B960494DF}">
-                  <a14:hiddenLine xmlns:a14="http://schemas.microsoft.com/office/drawing/2010/main" xmlns="" w="9525">
+                  <a14:hiddenLine xmlns="" xmlns:a14="http://schemas.microsoft.com/office/drawing/2010/main" w="9525">
                     <a:solidFill>
                       <a:srgbClr val="000000"/>
                     </a:solidFill>
@@ -11436,7 +11941,7 @@
               </a:ln>
               <a:extLst>
                 <a:ext uri="{91240B29-F687-4f45-9708-019B960494DF}">
-                  <a14:hiddenLine xmlns:a14="http://schemas.microsoft.com/office/drawing/2010/main" xmlns="" w="9525">
+                  <a14:hiddenLine xmlns="" xmlns:a14="http://schemas.microsoft.com/office/drawing/2010/main" w="9525">
                     <a:solidFill>
                       <a:srgbClr val="000000"/>
                     </a:solidFill>
@@ -11504,7 +12009,7 @@
               </a:ln>
               <a:extLst>
                 <a:ext uri="{91240B29-F687-4f45-9708-019B960494DF}">
-                  <a14:hiddenLine xmlns:a14="http://schemas.microsoft.com/office/drawing/2010/main" xmlns="" w="9525">
+                  <a14:hiddenLine xmlns="" xmlns:a14="http://schemas.microsoft.com/office/drawing/2010/main" w="9525">
                     <a:solidFill>
                       <a:srgbClr val="000000"/>
                     </a:solidFill>
@@ -11594,7 +12099,7 @@
               </a:ln>
               <a:extLst>
                 <a:ext uri="{91240B29-F687-4f45-9708-019B960494DF}">
-                  <a14:hiddenLine xmlns:a14="http://schemas.microsoft.com/office/drawing/2010/main" xmlns="" w="9525">
+                  <a14:hiddenLine xmlns="" xmlns:a14="http://schemas.microsoft.com/office/drawing/2010/main" w="9525">
                     <a:solidFill>
                       <a:srgbClr val="000000"/>
                     </a:solidFill>
@@ -11662,7 +12167,7 @@
               </a:ln>
               <a:extLst>
                 <a:ext uri="{91240B29-F687-4f45-9708-019B960494DF}">
-                  <a14:hiddenLine xmlns:a14="http://schemas.microsoft.com/office/drawing/2010/main" xmlns="" w="9525">
+                  <a14:hiddenLine xmlns="" xmlns:a14="http://schemas.microsoft.com/office/drawing/2010/main" w="9525">
                     <a:solidFill>
                       <a:srgbClr val="000000"/>
                     </a:solidFill>
@@ -11752,7 +12257,7 @@
               </a:ln>
               <a:extLst>
                 <a:ext uri="{91240B29-F687-4f45-9708-019B960494DF}">
-                  <a14:hiddenLine xmlns:a14="http://schemas.microsoft.com/office/drawing/2010/main" xmlns="" w="9525">
+                  <a14:hiddenLine xmlns="" xmlns:a14="http://schemas.microsoft.com/office/drawing/2010/main" w="9525">
                     <a:solidFill>
                       <a:srgbClr val="000000"/>
                     </a:solidFill>
@@ -11786,7 +12291,7 @@
               </a:ln>
               <a:extLst>
                 <a:ext uri="{91240B29-F687-4f45-9708-019B960494DF}">
-                  <a14:hiddenLine xmlns:a14="http://schemas.microsoft.com/office/drawing/2010/main" xmlns="" w="9525">
+                  <a14:hiddenLine xmlns="" xmlns:a14="http://schemas.microsoft.com/office/drawing/2010/main" w="9525">
                     <a:solidFill>
                       <a:srgbClr val="000000"/>
                     </a:solidFill>
@@ -12033,6 +12538,7 @@
     <p:sldLayoutId id="2147483668" r:id="rId15"/>
     <p:sldLayoutId id="2147483658" r:id="rId16"/>
     <p:sldLayoutId id="2147483659" r:id="rId17"/>
+    <p:sldLayoutId id="2147483669" r:id="rId18"/>
   </p:sldLayoutIdLst>
   <p:txStyles>
     <p:titleStyle>
@@ -12345,10 +12851,10 @@
       </p:grpSpPr>
       <p:sp>
         <p:nvSpPr>
-          <p:cNvPr id="2" name="Title 1">
+          <p:cNvPr id="3" name="Title 2">
             <a:extLst>
               <a:ext uri="{FF2B5EF4-FFF2-40B4-BE49-F238E27FC236}">
-                <a16:creationId xmlns:a16="http://schemas.microsoft.com/office/drawing/2014/main" id="{B120815F-FFC8-40C2-AE53-3C1E6EFE0492}"/>
+                <a16:creationId xmlns:a16="http://schemas.microsoft.com/office/drawing/2014/main" id="{C12E0AE5-F452-4F0C-9DE9-B15AE3DC2E30}"/>
               </a:ext>
             </a:extLst>
           </p:cNvPr>
@@ -12356,13 +12862,1300 @@
             <a:spLocks noGrp="1"/>
           </p:cNvSpPr>
           <p:nvPr>
-            <p:ph type="ctrTitle"/>
+            <p:ph type="title"/>
+          </p:nvPr>
+        </p:nvSpPr>
+        <p:spPr/>
+        <p:txBody>
+          <a:bodyPr/>
+          <a:lstStyle/>
+          <a:p>
+            <a:endParaRPr lang="en-US"/>
+          </a:p>
+        </p:txBody>
+      </p:sp>
+      <p:sp>
+        <p:nvSpPr>
+          <p:cNvPr id="4" name="Content Placeholder 3">
+            <a:extLst>
+              <a:ext uri="{FF2B5EF4-FFF2-40B4-BE49-F238E27FC236}">
+                <a16:creationId xmlns:a16="http://schemas.microsoft.com/office/drawing/2014/main" id="{5797AAA2-C76E-4899-9B29-B4E68E6E5459}"/>
+              </a:ext>
+            </a:extLst>
+          </p:cNvPr>
+          <p:cNvSpPr>
+            <a:spLocks noGrp="1"/>
+          </p:cNvSpPr>
+          <p:nvPr>
+            <p:ph idx="16"/>
+          </p:nvPr>
+        </p:nvSpPr>
+        <p:spPr/>
+        <p:txBody>
+          <a:bodyPr/>
+          <a:lstStyle/>
+          <a:p>
+            <a:endParaRPr lang="en-US"/>
+          </a:p>
+        </p:txBody>
+      </p:sp>
+      <p:sp>
+        <p:nvSpPr>
+          <p:cNvPr id="7" name="Slide Number Placeholder 6">
+            <a:extLst>
+              <a:ext uri="{FF2B5EF4-FFF2-40B4-BE49-F238E27FC236}">
+                <a16:creationId xmlns:a16="http://schemas.microsoft.com/office/drawing/2014/main" id="{49FDC6FE-758B-4F68-AF26-285741574A70}"/>
+              </a:ext>
+            </a:extLst>
+          </p:cNvPr>
+          <p:cNvSpPr>
+            <a:spLocks noGrp="1"/>
+          </p:cNvSpPr>
+          <p:nvPr>
+            <p:ph type="sldNum" sz="quarter" idx="12"/>
+          </p:nvPr>
+        </p:nvSpPr>
+        <p:spPr/>
+        <p:txBody>
+          <a:bodyPr/>
+          <a:lstStyle/>
+          <a:p>
+            <a:fld id="{3644D4AD-7034-5E45-AAAE-D685B84B781D}" type="slidenum">
+              <a:rPr lang="en-GB" noProof="0" smtClean="0"/>
+              <a:t>1</a:t>
+            </a:fld>
+            <a:endParaRPr lang="en-GB" noProof="0"/>
+          </a:p>
+        </p:txBody>
+      </p:sp>
+      <p:sp>
+        <p:nvSpPr>
+          <p:cNvPr id="8" name="Text Placeholder 7">
+            <a:extLst>
+              <a:ext uri="{FF2B5EF4-FFF2-40B4-BE49-F238E27FC236}">
+                <a16:creationId xmlns:a16="http://schemas.microsoft.com/office/drawing/2014/main" id="{41112FB3-1873-4A88-9AD7-D55A1E67DAE8}"/>
+              </a:ext>
+            </a:extLst>
+          </p:cNvPr>
+          <p:cNvSpPr>
+            <a:spLocks noGrp="1"/>
+          </p:cNvSpPr>
+          <p:nvPr>
+            <p:ph type="body" sz="quarter" idx="22"/>
+          </p:nvPr>
+        </p:nvSpPr>
+        <p:spPr/>
+        <p:txBody>
+          <a:bodyPr/>
+          <a:lstStyle/>
+          <a:p>
+            <a:endParaRPr lang="en-US"/>
+          </a:p>
+        </p:txBody>
+      </p:sp>
+      <p:pic>
+        <p:nvPicPr>
+          <p:cNvPr id="12" name="Picture Placeholder 11">
+            <a:extLst>
+              <a:ext uri="{FF2B5EF4-FFF2-40B4-BE49-F238E27FC236}">
+                <a16:creationId xmlns:a16="http://schemas.microsoft.com/office/drawing/2014/main" id="{12D649F5-670A-42B3-9A3E-A48964CE0E7C}"/>
+              </a:ext>
+            </a:extLst>
+          </p:cNvPr>
+          <p:cNvPicPr>
+            <a:picLocks noGrp="1" noChangeAspect="1"/>
+          </p:cNvPicPr>
+          <p:nvPr>
+            <p:ph type="pic" idx="14"/>
+          </p:nvPr>
+        </p:nvPicPr>
+        <p:blipFill>
+          <a:blip r:embed="rId2"/>
+          <a:srcRect t="3984" b="3984"/>
+          <a:stretch>
+            <a:fillRect/>
+          </a:stretch>
+        </p:blipFill>
+        <p:spPr>
+          <a:xfrm>
+            <a:off x="0" y="-62226"/>
+            <a:ext cx="12192000" cy="4217775"/>
+          </a:xfrm>
+          <a:prstGeom prst="rect">
+            <a:avLst/>
+          </a:prstGeom>
+        </p:spPr>
+      </p:pic>
+      <p:sp>
+        <p:nvSpPr>
+          <p:cNvPr id="13" name="Rectangle 12">
+            <a:extLst>
+              <a:ext uri="{FF2B5EF4-FFF2-40B4-BE49-F238E27FC236}">
+                <a16:creationId xmlns:a16="http://schemas.microsoft.com/office/drawing/2014/main" id="{7A1CCD4C-2B9C-4CDC-9128-C136E4C205A5}"/>
+              </a:ext>
+            </a:extLst>
+          </p:cNvPr>
+          <p:cNvSpPr/>
+          <p:nvPr/>
+        </p:nvSpPr>
+        <p:spPr>
+          <a:xfrm>
+            <a:off x="5920353" y="1436176"/>
+            <a:ext cx="5786035" cy="4875824"/>
+          </a:xfrm>
+          <a:prstGeom prst="rect">
+            <a:avLst/>
+          </a:prstGeom>
+        </p:spPr>
+        <p:style>
+          <a:lnRef idx="2">
+            <a:schemeClr val="accent1">
+              <a:shade val="50000"/>
+            </a:schemeClr>
+          </a:lnRef>
+          <a:fillRef idx="1">
+            <a:schemeClr val="accent1"/>
+          </a:fillRef>
+          <a:effectRef idx="0">
+            <a:schemeClr val="accent1"/>
+          </a:effectRef>
+          <a:fontRef idx="minor">
+            <a:schemeClr val="lt1"/>
+          </a:fontRef>
+        </p:style>
+        <p:txBody>
+          <a:bodyPr rtlCol="0" anchor="ctr"/>
+          <a:lstStyle/>
+          <a:p>
+            <a:pPr algn="ctr"/>
+            <a:endParaRPr lang="en-US" sz="2400" dirty="0"/>
+          </a:p>
+        </p:txBody>
+      </p:sp>
+      <p:sp>
+        <p:nvSpPr>
+          <p:cNvPr id="14" name="TextBox 13">
+            <a:extLst>
+              <a:ext uri="{FF2B5EF4-FFF2-40B4-BE49-F238E27FC236}">
+                <a16:creationId xmlns:a16="http://schemas.microsoft.com/office/drawing/2014/main" id="{D43ABA20-AD80-4703-BF31-632643580068}"/>
+              </a:ext>
+            </a:extLst>
+          </p:cNvPr>
+          <p:cNvSpPr txBox="1"/>
+          <p:nvPr/>
+        </p:nvSpPr>
+        <p:spPr>
+          <a:xfrm>
+            <a:off x="6163159" y="1709081"/>
+            <a:ext cx="5786035" cy="995209"/>
+          </a:xfrm>
+          <a:prstGeom prst="rect">
+            <a:avLst/>
+          </a:prstGeom>
+          <a:noFill/>
+        </p:spPr>
+        <p:txBody>
+          <a:bodyPr wrap="square" rtlCol="0">
+            <a:spAutoFit/>
+          </a:bodyPr>
+          <a:lstStyle/>
+          <a:p>
+            <a:r>
+              <a:rPr lang="en-US" sz="5867" dirty="0">
+                <a:solidFill>
+                  <a:schemeClr val="bg2"/>
+                </a:solidFill>
+              </a:rPr>
+              <a:t>IDS (</a:t>
+            </a:r>
+            <a:r>
+              <a:rPr lang="en-US" sz="3200" dirty="0">
+                <a:solidFill>
+                  <a:schemeClr val="bg2"/>
+                </a:solidFill>
+              </a:rPr>
+              <a:t>Identity System</a:t>
+            </a:r>
+            <a:r>
+              <a:rPr lang="en-US" sz="5867" dirty="0">
+                <a:solidFill>
+                  <a:schemeClr val="bg2"/>
+                </a:solidFill>
+              </a:rPr>
+              <a:t>)</a:t>
+            </a:r>
+          </a:p>
+        </p:txBody>
+      </p:sp>
+      <p:sp>
+        <p:nvSpPr>
+          <p:cNvPr id="15" name="TextBox 14">
+            <a:extLst>
+              <a:ext uri="{FF2B5EF4-FFF2-40B4-BE49-F238E27FC236}">
+                <a16:creationId xmlns:a16="http://schemas.microsoft.com/office/drawing/2014/main" id="{89BE4EDC-1DCA-4CFF-912B-0C1DC201DD8E}"/>
+              </a:ext>
+            </a:extLst>
+          </p:cNvPr>
+          <p:cNvSpPr txBox="1"/>
+          <p:nvPr/>
+        </p:nvSpPr>
+        <p:spPr>
+          <a:xfrm>
+            <a:off x="6168327" y="4217776"/>
+            <a:ext cx="2645044" cy="461665"/>
+          </a:xfrm>
+          <a:prstGeom prst="rect">
+            <a:avLst/>
+          </a:prstGeom>
+          <a:noFill/>
+        </p:spPr>
+        <p:txBody>
+          <a:bodyPr wrap="square" rtlCol="0">
+            <a:spAutoFit/>
+          </a:bodyPr>
+          <a:lstStyle/>
+          <a:p>
+            <a:r>
+              <a:rPr lang="en-US" sz="2400" dirty="0">
+                <a:solidFill>
+                  <a:schemeClr val="bg2"/>
+                </a:solidFill>
+              </a:rPr>
+              <a:t>#TU202113</a:t>
+            </a:r>
+          </a:p>
+        </p:txBody>
+      </p:sp>
+      <p:sp>
+        <p:nvSpPr>
+          <p:cNvPr id="16" name="TextBox 15">
+            <a:extLst>
+              <a:ext uri="{FF2B5EF4-FFF2-40B4-BE49-F238E27FC236}">
+                <a16:creationId xmlns:a16="http://schemas.microsoft.com/office/drawing/2014/main" id="{B48BB76B-E04F-4246-BFC4-16AB763E7622}"/>
+              </a:ext>
+            </a:extLst>
+          </p:cNvPr>
+          <p:cNvSpPr txBox="1"/>
+          <p:nvPr/>
+        </p:nvSpPr>
+        <p:spPr>
+          <a:xfrm>
+            <a:off x="6477001" y="2828925"/>
+            <a:ext cx="5105400" cy="1569660"/>
+          </a:xfrm>
+          <a:prstGeom prst="rect">
+            <a:avLst/>
+          </a:prstGeom>
+          <a:noFill/>
+        </p:spPr>
+        <p:txBody>
+          <a:bodyPr wrap="square" rtlCol="0">
+            <a:spAutoFit/>
+          </a:bodyPr>
+          <a:lstStyle/>
+          <a:p>
+            <a:r>
+              <a:rPr lang="en-US" sz="2400" dirty="0"/>
+              <a:t>Secure login with </a:t>
+            </a:r>
+            <a:r>
+              <a:rPr lang="en-US" sz="2400" dirty="0" err="1"/>
+              <a:t>Api</a:t>
+            </a:r>
+            <a:r>
+              <a:rPr lang="en-US" sz="2400" dirty="0"/>
+              <a:t> </a:t>
+            </a:r>
+            <a:r>
+              <a:rPr lang="en-US" sz="2400" dirty="0" err="1"/>
+              <a:t>GateWay</a:t>
+            </a:r>
+            <a:r>
+              <a:rPr lang="en-US" sz="2400" dirty="0"/>
+              <a:t> </a:t>
+            </a:r>
+            <a:r>
+              <a:rPr lang="en-US" sz="2400" dirty="0" err="1"/>
+              <a:t>Intigration</a:t>
+            </a:r>
+            <a:r>
+              <a:rPr lang="en-US" sz="2400" dirty="0"/>
+              <a:t> in the </a:t>
+            </a:r>
+            <a:r>
+              <a:rPr lang="en-US" sz="2400" dirty="0" err="1"/>
+              <a:t>applicaion</a:t>
+            </a:r>
+            <a:r>
+              <a:rPr lang="en-US" sz="2400" dirty="0"/>
+              <a:t> using (IDS) Identity System server</a:t>
+            </a:r>
+          </a:p>
+          <a:p>
+            <a:endParaRPr lang="en-US" sz="2400" dirty="0">
+              <a:solidFill>
+                <a:schemeClr val="bg2"/>
+              </a:solidFill>
+            </a:endParaRPr>
+          </a:p>
+        </p:txBody>
+      </p:sp>
+    </p:spTree>
+    <p:extLst>
+      <p:ext uri="{BB962C8B-B14F-4D97-AF65-F5344CB8AC3E}">
+        <p14:creationId xmlns:p14="http://schemas.microsoft.com/office/powerpoint/2010/main" val="477162892"/>
+      </p:ext>
+    </p:extLst>
+  </p:cSld>
+  <p:clrMapOvr>
+    <a:masterClrMapping/>
+  </p:clrMapOvr>
+  <mc:AlternateContent xmlns:mc="http://schemas.openxmlformats.org/markup-compatibility/2006" xmlns:p14="http://schemas.microsoft.com/office/powerpoint/2010/main">
+    <mc:Choice Requires="p14">
+      <p:transition spd="med" p14:dur="700">
+        <p:fade/>
+      </p:transition>
+    </mc:Choice>
+    <mc:Fallback xmlns="">
+      <p:transition spd="med">
+        <p:fade/>
+      </p:transition>
+    </mc:Fallback>
+  </mc:AlternateContent>
+</p:sld>
+</file>
+
+<file path=ppt/slides/slide2.xml><?xml version="1.0" encoding="utf-8"?>
+<p:sld xmlns:a="http://schemas.openxmlformats.org/drawingml/2006/main" xmlns:r="http://schemas.openxmlformats.org/officeDocument/2006/relationships" xmlns:p="http://schemas.openxmlformats.org/presentationml/2006/main">
+  <p:cSld>
+    <p:spTree>
+      <p:nvGrpSpPr>
+        <p:cNvPr id="1" name=""/>
+        <p:cNvGrpSpPr/>
+        <p:nvPr/>
+      </p:nvGrpSpPr>
+      <p:grpSpPr>
+        <a:xfrm>
+          <a:off x="0" y="0"/>
+          <a:ext cx="0" cy="0"/>
+          <a:chOff x="0" y="0"/>
+          <a:chExt cx="0" cy="0"/>
+        </a:xfrm>
+      </p:grpSpPr>
+      <p:grpSp>
+        <p:nvGrpSpPr>
+          <p:cNvPr id="9" name="Group 8">
+            <a:extLst>
+              <a:ext uri="{FF2B5EF4-FFF2-40B4-BE49-F238E27FC236}">
+                <a16:creationId xmlns:a16="http://schemas.microsoft.com/office/drawing/2014/main" id="{05F9129B-0181-4E3F-9F05-4A7BE3C8E319}"/>
+              </a:ext>
+            </a:extLst>
+          </p:cNvPr>
+          <p:cNvGrpSpPr/>
+          <p:nvPr/>
+        </p:nvGrpSpPr>
+        <p:grpSpPr>
+          <a:xfrm>
+            <a:off x="3139846" y="3155443"/>
+            <a:ext cx="7842479" cy="893372"/>
+            <a:chOff x="-3288022" y="1852674"/>
+            <a:chExt cx="7842479" cy="893372"/>
+          </a:xfrm>
+        </p:grpSpPr>
+        <p:sp>
+          <p:nvSpPr>
+            <p:cNvPr id="11" name="TextBox 10">
+              <a:extLst>
+                <a:ext uri="{FF2B5EF4-FFF2-40B4-BE49-F238E27FC236}">
+                  <a16:creationId xmlns:a16="http://schemas.microsoft.com/office/drawing/2014/main" id="{66517EA2-2963-4BC8-89B9-FD6614BE9064}"/>
+                </a:ext>
+              </a:extLst>
+            </p:cNvPr>
+            <p:cNvSpPr txBox="1"/>
+            <p:nvPr/>
+          </p:nvSpPr>
+          <p:spPr>
+            <a:xfrm>
+              <a:off x="2603716" y="1852674"/>
+              <a:ext cx="1950741" cy="369332"/>
+            </a:xfrm>
+            <a:prstGeom prst="rect">
+              <a:avLst/>
+            </a:prstGeom>
+            <a:noFill/>
+          </p:spPr>
+          <p:txBody>
+            <a:bodyPr wrap="square" rtlCol="0">
+              <a:spAutoFit/>
+            </a:bodyPr>
+            <a:lstStyle/>
+            <a:p>
+              <a:pPr algn="ctr"/>
+              <a:r>
+                <a:rPr lang="en-US" dirty="0"/>
+                <a:t>Shashidhar Jadhav</a:t>
+              </a:r>
+            </a:p>
+          </p:txBody>
+        </p:sp>
+        <p:sp>
+          <p:nvSpPr>
+            <p:cNvPr id="12" name="TextBox 11">
+              <a:extLst>
+                <a:ext uri="{FF2B5EF4-FFF2-40B4-BE49-F238E27FC236}">
+                  <a16:creationId xmlns:a16="http://schemas.microsoft.com/office/drawing/2014/main" id="{7444939B-13CB-4420-BFC3-4FC0C8728894}"/>
+                </a:ext>
+              </a:extLst>
+            </p:cNvPr>
+            <p:cNvSpPr txBox="1"/>
+            <p:nvPr/>
+          </p:nvSpPr>
+          <p:spPr>
+            <a:xfrm>
+              <a:off x="2603715" y="2196466"/>
+              <a:ext cx="1720311" cy="461665"/>
+            </a:xfrm>
+            <a:prstGeom prst="rect">
+              <a:avLst/>
+            </a:prstGeom>
+            <a:noFill/>
+          </p:spPr>
+          <p:txBody>
+            <a:bodyPr wrap="square" rtlCol="0">
+              <a:spAutoFit/>
+            </a:bodyPr>
+            <a:lstStyle/>
+            <a:p>
+              <a:pPr algn="ctr"/>
+              <a:r>
+                <a:rPr lang="en-US" sz="1200" dirty="0"/>
+                <a:t>Senior Software Engineer</a:t>
+              </a:r>
+            </a:p>
+            <a:p>
+              <a:pPr algn="ctr"/>
+              <a:endParaRPr lang="en-US" sz="1200" dirty="0"/>
+            </a:p>
+          </p:txBody>
+        </p:sp>
+        <p:sp>
+          <p:nvSpPr>
+            <p:cNvPr id="13" name="TextBox 12">
+              <a:extLst>
+                <a:ext uri="{FF2B5EF4-FFF2-40B4-BE49-F238E27FC236}">
+                  <a16:creationId xmlns:a16="http://schemas.microsoft.com/office/drawing/2014/main" id="{DEFAECB2-6434-4871-9156-BB23434B3A93}"/>
+                </a:ext>
+              </a:extLst>
+            </p:cNvPr>
+            <p:cNvSpPr txBox="1"/>
+            <p:nvPr/>
+          </p:nvSpPr>
+          <p:spPr>
+            <a:xfrm>
+              <a:off x="2603715" y="2435364"/>
+              <a:ext cx="1720311" cy="276999"/>
+            </a:xfrm>
+            <a:prstGeom prst="rect">
+              <a:avLst/>
+            </a:prstGeom>
+            <a:noFill/>
+          </p:spPr>
+          <p:txBody>
+            <a:bodyPr wrap="square" rtlCol="0">
+              <a:spAutoFit/>
+            </a:bodyPr>
+            <a:lstStyle/>
+            <a:p>
+              <a:pPr algn="ctr"/>
+              <a:r>
+                <a:rPr lang="en-US" sz="1200" dirty="0"/>
+                <a:t>I&amp;H</a:t>
+              </a:r>
+            </a:p>
+          </p:txBody>
+        </p:sp>
+        <p:sp>
+          <p:nvSpPr>
+            <p:cNvPr id="63" name="TextBox 62">
+              <a:extLst>
+                <a:ext uri="{FF2B5EF4-FFF2-40B4-BE49-F238E27FC236}">
+                  <a16:creationId xmlns:a16="http://schemas.microsoft.com/office/drawing/2014/main" id="{49DF59B0-F309-44BD-84EA-0BAA7F626F51}"/>
+                </a:ext>
+              </a:extLst>
+            </p:cNvPr>
+            <p:cNvSpPr txBox="1"/>
+            <p:nvPr/>
+          </p:nvSpPr>
+          <p:spPr>
+            <a:xfrm>
+              <a:off x="-3288022" y="2263441"/>
+              <a:ext cx="1720311" cy="461665"/>
+            </a:xfrm>
+            <a:prstGeom prst="rect">
+              <a:avLst/>
+            </a:prstGeom>
+            <a:noFill/>
+          </p:spPr>
+          <p:txBody>
+            <a:bodyPr wrap="square" rtlCol="0">
+              <a:spAutoFit/>
+            </a:bodyPr>
+            <a:lstStyle/>
+            <a:p>
+              <a:pPr algn="ctr"/>
+              <a:r>
+                <a:rPr lang="en-US" sz="1200" dirty="0"/>
+                <a:t>Senior Software Engineer</a:t>
+              </a:r>
+            </a:p>
+            <a:p>
+              <a:pPr algn="ctr"/>
+              <a:endParaRPr lang="en-US" sz="1200" dirty="0"/>
+            </a:p>
+          </p:txBody>
+        </p:sp>
+        <p:sp>
+          <p:nvSpPr>
+            <p:cNvPr id="64" name="TextBox 63">
+              <a:extLst>
+                <a:ext uri="{FF2B5EF4-FFF2-40B4-BE49-F238E27FC236}">
+                  <a16:creationId xmlns:a16="http://schemas.microsoft.com/office/drawing/2014/main" id="{A22B927F-1FA4-45CF-A50A-FED69C8F7518}"/>
+                </a:ext>
+              </a:extLst>
+            </p:cNvPr>
+            <p:cNvSpPr txBox="1"/>
+            <p:nvPr/>
+          </p:nvSpPr>
+          <p:spPr>
+            <a:xfrm>
+              <a:off x="-3172807" y="2469047"/>
+              <a:ext cx="1720311" cy="276999"/>
+            </a:xfrm>
+            <a:prstGeom prst="rect">
+              <a:avLst/>
+            </a:prstGeom>
+            <a:noFill/>
+          </p:spPr>
+          <p:txBody>
+            <a:bodyPr wrap="square" rtlCol="0">
+              <a:spAutoFit/>
+            </a:bodyPr>
+            <a:lstStyle/>
+            <a:p>
+              <a:pPr algn="ctr"/>
+              <a:r>
+                <a:rPr lang="en-US" sz="1200" dirty="0"/>
+                <a:t>I&amp;H</a:t>
+              </a:r>
+            </a:p>
+          </p:txBody>
+        </p:sp>
+      </p:grpSp>
+      <p:grpSp>
+        <p:nvGrpSpPr>
+          <p:cNvPr id="14" name="Group 13">
+            <a:extLst>
+              <a:ext uri="{FF2B5EF4-FFF2-40B4-BE49-F238E27FC236}">
+                <a16:creationId xmlns:a16="http://schemas.microsoft.com/office/drawing/2014/main" id="{04781F74-49FA-4031-B14D-68EF56A18844}"/>
+              </a:ext>
+            </a:extLst>
+          </p:cNvPr>
+          <p:cNvGrpSpPr/>
+          <p:nvPr/>
+        </p:nvGrpSpPr>
+        <p:grpSpPr>
+          <a:xfrm>
+            <a:off x="5663141" y="3155443"/>
+            <a:ext cx="2431512" cy="859689"/>
+            <a:chOff x="2271866" y="1852674"/>
+            <a:chExt cx="2431512" cy="859689"/>
+          </a:xfrm>
+        </p:grpSpPr>
+        <p:sp>
+          <p:nvSpPr>
+            <p:cNvPr id="16" name="TextBox 15">
+              <a:extLst>
+                <a:ext uri="{FF2B5EF4-FFF2-40B4-BE49-F238E27FC236}">
+                  <a16:creationId xmlns:a16="http://schemas.microsoft.com/office/drawing/2014/main" id="{AA1628C7-F909-498C-A591-E80611B07F00}"/>
+                </a:ext>
+              </a:extLst>
+            </p:cNvPr>
+            <p:cNvSpPr txBox="1"/>
+            <p:nvPr/>
+          </p:nvSpPr>
+          <p:spPr>
+            <a:xfrm>
+              <a:off x="2271866" y="1852674"/>
+              <a:ext cx="2431512" cy="369332"/>
+            </a:xfrm>
+            <a:prstGeom prst="rect">
+              <a:avLst/>
+            </a:prstGeom>
+            <a:noFill/>
+          </p:spPr>
+          <p:txBody>
+            <a:bodyPr wrap="square" rtlCol="0">
+              <a:spAutoFit/>
+            </a:bodyPr>
+            <a:lstStyle/>
+            <a:p>
+              <a:pPr algn="ctr"/>
+              <a:r>
+                <a:rPr lang="en-US" dirty="0" err="1"/>
+                <a:t>Shrinidhi</a:t>
+              </a:r>
+              <a:r>
+                <a:rPr lang="en-US" dirty="0"/>
+                <a:t> Joshi</a:t>
+              </a:r>
+            </a:p>
+          </p:txBody>
+        </p:sp>
+        <p:sp>
+          <p:nvSpPr>
+            <p:cNvPr id="17" name="TextBox 16">
+              <a:extLst>
+                <a:ext uri="{FF2B5EF4-FFF2-40B4-BE49-F238E27FC236}">
+                  <a16:creationId xmlns:a16="http://schemas.microsoft.com/office/drawing/2014/main" id="{BE226939-524D-4291-87EC-6D2F86374AE6}"/>
+                </a:ext>
+              </a:extLst>
+            </p:cNvPr>
+            <p:cNvSpPr txBox="1"/>
+            <p:nvPr/>
+          </p:nvSpPr>
+          <p:spPr>
+            <a:xfrm>
+              <a:off x="2603715" y="2196466"/>
+              <a:ext cx="1720311" cy="276999"/>
+            </a:xfrm>
+            <a:prstGeom prst="rect">
+              <a:avLst/>
+            </a:prstGeom>
+            <a:noFill/>
+          </p:spPr>
+          <p:txBody>
+            <a:bodyPr wrap="square" rtlCol="0">
+              <a:spAutoFit/>
+            </a:bodyPr>
+            <a:lstStyle/>
+            <a:p>
+              <a:pPr algn="ctr"/>
+              <a:r>
+                <a:rPr lang="en-US" sz="1200" dirty="0"/>
+                <a:t>Senior Test Engineer JL11</a:t>
+              </a:r>
+            </a:p>
+          </p:txBody>
+        </p:sp>
+        <p:sp>
+          <p:nvSpPr>
+            <p:cNvPr id="18" name="TextBox 17">
+              <a:extLst>
+                <a:ext uri="{FF2B5EF4-FFF2-40B4-BE49-F238E27FC236}">
+                  <a16:creationId xmlns:a16="http://schemas.microsoft.com/office/drawing/2014/main" id="{0F7D3F23-91F1-4FD6-8420-0C86112A86E9}"/>
+                </a:ext>
+              </a:extLst>
+            </p:cNvPr>
+            <p:cNvSpPr txBox="1"/>
+            <p:nvPr/>
+          </p:nvSpPr>
+          <p:spPr>
+            <a:xfrm>
+              <a:off x="2603715" y="2435364"/>
+              <a:ext cx="1720311" cy="276999"/>
+            </a:xfrm>
+            <a:prstGeom prst="rect">
+              <a:avLst/>
+            </a:prstGeom>
+            <a:noFill/>
+          </p:spPr>
+          <p:txBody>
+            <a:bodyPr wrap="square" rtlCol="0">
+              <a:spAutoFit/>
+            </a:bodyPr>
+            <a:lstStyle/>
+            <a:p>
+              <a:pPr algn="ctr"/>
+              <a:r>
+                <a:rPr lang="en-US" sz="1200" dirty="0"/>
+                <a:t>I&amp;H</a:t>
+              </a:r>
+            </a:p>
+          </p:txBody>
+        </p:sp>
+      </p:grpSp>
+      <p:pic>
+        <p:nvPicPr>
+          <p:cNvPr id="50" name="Picture 49" descr="A picture containing person, outdoor, grass, person&#10;&#10;Description automatically generated">
+            <a:extLst>
+              <a:ext uri="{FF2B5EF4-FFF2-40B4-BE49-F238E27FC236}">
+                <a16:creationId xmlns:a16="http://schemas.microsoft.com/office/drawing/2014/main" id="{1C0945A9-FB1A-4DD1-B29F-4F37CEAD4D25}"/>
+              </a:ext>
+            </a:extLst>
+          </p:cNvPr>
+          <p:cNvPicPr>
+            <a:picLocks noChangeAspect="1"/>
+          </p:cNvPicPr>
+          <p:nvPr/>
+        </p:nvPicPr>
+        <p:blipFill>
+          <a:blip r:embed="rId2"/>
+          <a:stretch>
+            <a:fillRect/>
+          </a:stretch>
+        </p:blipFill>
+        <p:spPr>
+          <a:xfrm>
+            <a:off x="2823516" y="1000655"/>
+            <a:ext cx="2167583" cy="2191937"/>
+          </a:xfrm>
+          <a:prstGeom prst="rect">
+            <a:avLst/>
+          </a:prstGeom>
+        </p:spPr>
+      </p:pic>
+      <p:pic>
+        <p:nvPicPr>
+          <p:cNvPr id="61" name="Picture 60">
+            <a:extLst>
+              <a:ext uri="{FF2B5EF4-FFF2-40B4-BE49-F238E27FC236}">
+                <a16:creationId xmlns:a16="http://schemas.microsoft.com/office/drawing/2014/main" id="{9D00235C-8150-4A81-BBE8-EB3FBD93C6D0}"/>
+              </a:ext>
+            </a:extLst>
+          </p:cNvPr>
+          <p:cNvPicPr>
+            <a:picLocks noChangeAspect="1"/>
+          </p:cNvPicPr>
+          <p:nvPr/>
+        </p:nvPicPr>
+        <p:blipFill>
+          <a:blip r:embed="rId3"/>
+          <a:stretch>
+            <a:fillRect/>
+          </a:stretch>
+        </p:blipFill>
+        <p:spPr>
+          <a:xfrm>
+            <a:off x="5741464" y="1000655"/>
+            <a:ext cx="2167583" cy="2167583"/>
+          </a:xfrm>
+          <a:prstGeom prst="rect">
+            <a:avLst/>
+          </a:prstGeom>
+        </p:spPr>
+      </p:pic>
+      <p:sp>
+        <p:nvSpPr>
+          <p:cNvPr id="62" name="TextBox 61">
+            <a:extLst>
+              <a:ext uri="{FF2B5EF4-FFF2-40B4-BE49-F238E27FC236}">
+                <a16:creationId xmlns:a16="http://schemas.microsoft.com/office/drawing/2014/main" id="{17BC7439-97E2-4853-92AF-AB1C4C01B175}"/>
+              </a:ext>
+            </a:extLst>
+          </p:cNvPr>
+          <p:cNvSpPr txBox="1"/>
+          <p:nvPr/>
+        </p:nvSpPr>
+        <p:spPr>
+          <a:xfrm>
+            <a:off x="2876845" y="3268402"/>
+            <a:ext cx="2304755" cy="369332"/>
+          </a:xfrm>
+          <a:prstGeom prst="rect">
+            <a:avLst/>
+          </a:prstGeom>
+          <a:noFill/>
+        </p:spPr>
+        <p:txBody>
+          <a:bodyPr wrap="square" rtlCol="0">
+            <a:spAutoFit/>
+          </a:bodyPr>
+          <a:lstStyle/>
+          <a:p>
+            <a:pPr algn="ctr"/>
+            <a:r>
+              <a:rPr lang="en-US" dirty="0"/>
+              <a:t>Prakash Chinnappa</a:t>
+            </a:r>
+          </a:p>
+        </p:txBody>
+      </p:sp>
+      <p:pic>
+        <p:nvPicPr>
+          <p:cNvPr id="67" name="Picture Placeholder 93">
+            <a:extLst>
+              <a:ext uri="{FF2B5EF4-FFF2-40B4-BE49-F238E27FC236}">
+                <a16:creationId xmlns:a16="http://schemas.microsoft.com/office/drawing/2014/main" id="{4216AE27-F975-4F29-A73C-E82E09CBFD25}"/>
+              </a:ext>
+            </a:extLst>
+          </p:cNvPr>
+          <p:cNvPicPr>
+            <a:picLocks noChangeAspect="1"/>
+          </p:cNvPicPr>
+          <p:nvPr/>
+        </p:nvPicPr>
+        <p:blipFill rotWithShape="1">
+          <a:blip r:embed="rId4" cstate="hqprint">
+            <a:extLst>
+              <a:ext uri="{28A0092B-C50C-407E-A947-70E740481C1C}">
+                <a14:useLocalDpi xmlns:a14="http://schemas.microsoft.com/office/drawing/2010/main"/>
+              </a:ext>
+            </a:extLst>
+          </a:blip>
+          <a:srcRect/>
+          <a:stretch/>
+        </p:blipFill>
+        <p:spPr>
+          <a:xfrm>
+            <a:off x="0" y="0"/>
+            <a:ext cx="2512689" cy="6858000"/>
+          </a:xfrm>
+          <a:prstGeom prst="rect">
+            <a:avLst/>
+          </a:prstGeom>
+        </p:spPr>
+      </p:pic>
+      <p:sp>
+        <p:nvSpPr>
+          <p:cNvPr id="68" name="Title 10">
+            <a:extLst>
+              <a:ext uri="{FF2B5EF4-FFF2-40B4-BE49-F238E27FC236}">
+                <a16:creationId xmlns:a16="http://schemas.microsoft.com/office/drawing/2014/main" id="{1A80D741-2691-4D0D-9A4D-941D5E2408D9}"/>
+              </a:ext>
+            </a:extLst>
+          </p:cNvPr>
+          <p:cNvSpPr txBox="1">
+            <a:spLocks/>
+          </p:cNvSpPr>
+          <p:nvPr/>
+        </p:nvSpPr>
+        <p:spPr>
+          <a:xfrm>
+            <a:off x="129600" y="555625"/>
+            <a:ext cx="2383089" cy="1201594"/>
+          </a:xfrm>
+          <a:prstGeom prst="rect">
+            <a:avLst/>
+          </a:prstGeom>
+        </p:spPr>
+        <p:txBody>
+          <a:bodyPr vert="horz" lIns="91440" tIns="45720" rIns="91440" bIns="45720" rtlCol="0" anchor="b">
+            <a:normAutofit/>
+          </a:bodyPr>
+          <a:lstStyle>
+            <a:lvl1pPr algn="l" defTabSz="914400" rtl="0" eaLnBrk="1" latinLnBrk="0" hangingPunct="1">
+              <a:lnSpc>
+                <a:spcPct val="90000"/>
+              </a:lnSpc>
+              <a:spcBef>
+                <a:spcPct val="0"/>
+              </a:spcBef>
+              <a:buNone/>
+              <a:defRPr sz="4800" kern="1200" cap="all" baseline="0">
+                <a:solidFill>
+                  <a:schemeClr val="tx1"/>
+                </a:solidFill>
+                <a:latin typeface="+mj-lt"/>
+                <a:ea typeface="+mj-ea"/>
+                <a:cs typeface="+mj-cs"/>
+              </a:defRPr>
+            </a:lvl1pPr>
+          </a:lstStyle>
+          <a:p>
+            <a:pPr algn="r"/>
+            <a:r>
+              <a:rPr lang="en-US" sz="2000" dirty="0">
+                <a:solidFill>
+                  <a:schemeClr val="bg2"/>
+                </a:solidFill>
+                <a:latin typeface="Arial"/>
+                <a:cs typeface="Arial"/>
+              </a:rPr>
+              <a:t>Our Introduction </a:t>
+            </a:r>
+          </a:p>
+        </p:txBody>
+      </p:sp>
+      <p:pic>
+        <p:nvPicPr>
+          <p:cNvPr id="71" name="Picture 70" descr="A picture containing person, person&#10;&#10;Description automatically generated">
+            <a:extLst>
+              <a:ext uri="{FF2B5EF4-FFF2-40B4-BE49-F238E27FC236}">
+                <a16:creationId xmlns:a16="http://schemas.microsoft.com/office/drawing/2014/main" id="{A80B22CE-0920-4FD1-ACF6-AA0CA99A9B27}"/>
+              </a:ext>
+            </a:extLst>
+          </p:cNvPr>
+          <p:cNvPicPr>
+            <a:picLocks noChangeAspect="1"/>
+          </p:cNvPicPr>
+          <p:nvPr/>
+        </p:nvPicPr>
+        <p:blipFill>
+          <a:blip r:embed="rId5"/>
+          <a:stretch>
+            <a:fillRect/>
+          </a:stretch>
+        </p:blipFill>
+        <p:spPr>
+          <a:xfrm>
+            <a:off x="8927936" y="978596"/>
+            <a:ext cx="2054390" cy="2040829"/>
+          </a:xfrm>
+          <a:prstGeom prst="rect">
+            <a:avLst/>
+          </a:prstGeom>
+        </p:spPr>
+      </p:pic>
+    </p:spTree>
+    <p:extLst>
+      <p:ext uri="{BB962C8B-B14F-4D97-AF65-F5344CB8AC3E}">
+        <p14:creationId xmlns:p14="http://schemas.microsoft.com/office/powerpoint/2010/main" val="69988641"/>
+      </p:ext>
+    </p:extLst>
+  </p:cSld>
+  <p:clrMapOvr>
+    <a:masterClrMapping/>
+  </p:clrMapOvr>
+</p:sld>
+</file>
+
+<file path=ppt/slides/slide3.xml><?xml version="1.0" encoding="utf-8"?>
+<p:sld xmlns:a="http://schemas.openxmlformats.org/drawingml/2006/main" xmlns:r="http://schemas.openxmlformats.org/officeDocument/2006/relationships" xmlns:p="http://schemas.openxmlformats.org/presentationml/2006/main">
+  <p:cSld>
+    <p:spTree>
+      <p:nvGrpSpPr>
+        <p:cNvPr id="1" name=""/>
+        <p:cNvGrpSpPr/>
+        <p:nvPr/>
+      </p:nvGrpSpPr>
+      <p:grpSpPr>
+        <a:xfrm>
+          <a:off x="0" y="0"/>
+          <a:ext cx="0" cy="0"/>
+          <a:chOff x="0" y="0"/>
+          <a:chExt cx="0" cy="0"/>
+        </a:xfrm>
+      </p:grpSpPr>
+      <p:sp>
+        <p:nvSpPr>
+          <p:cNvPr id="3" name="Content Placeholder 2">
+            <a:extLst>
+              <a:ext uri="{FF2B5EF4-FFF2-40B4-BE49-F238E27FC236}">
+                <a16:creationId xmlns:a16="http://schemas.microsoft.com/office/drawing/2014/main" id="{413B841E-1226-425A-8FEA-877CF21CF885}"/>
+              </a:ext>
+            </a:extLst>
+          </p:cNvPr>
+          <p:cNvSpPr>
+            <a:spLocks noGrp="1"/>
+          </p:cNvSpPr>
+          <p:nvPr>
+            <p:ph idx="1"/>
           </p:nvPr>
         </p:nvSpPr>
         <p:spPr>
           <a:xfrm>
-            <a:off x="1876424" y="923926"/>
-            <a:ext cx="8791575" cy="1619250"/>
+            <a:off x="1141412" y="2249487"/>
+            <a:ext cx="9905999" cy="1312863"/>
+          </a:xfrm>
+        </p:spPr>
+        <p:txBody>
+          <a:bodyPr/>
+          <a:lstStyle/>
+          <a:p>
+            <a:r>
+              <a:rPr lang="en-US" sz="2400" dirty="0"/>
+              <a:t>For Multiple Application login Credential details saved in different database server with different access rights</a:t>
+            </a:r>
+          </a:p>
+          <a:p>
+            <a:endParaRPr lang="en-US" dirty="0"/>
+          </a:p>
+        </p:txBody>
+      </p:sp>
+      <p:sp>
+        <p:nvSpPr>
+          <p:cNvPr id="4" name="Title 1">
+            <a:extLst>
+              <a:ext uri="{FF2B5EF4-FFF2-40B4-BE49-F238E27FC236}">
+                <a16:creationId xmlns:a16="http://schemas.microsoft.com/office/drawing/2014/main" id="{A3741E6C-D74E-4FC6-9724-2873E6A98F07}"/>
+              </a:ext>
+            </a:extLst>
+          </p:cNvPr>
+          <p:cNvSpPr txBox="1">
+            <a:spLocks/>
+          </p:cNvSpPr>
+          <p:nvPr/>
+        </p:nvSpPr>
+        <p:spPr>
+          <a:xfrm>
+            <a:off x="1284288" y="3310311"/>
+            <a:ext cx="9905998" cy="1478570"/>
+          </a:xfrm>
+          <a:prstGeom prst="rect">
+            <a:avLst/>
+          </a:prstGeom>
+        </p:spPr>
+        <p:txBody>
+          <a:bodyPr vert="horz" lIns="91440" tIns="45720" rIns="91440" bIns="45720" rtlCol="0" anchor="ctr">
+            <a:normAutofit/>
+          </a:bodyPr>
+          <a:lstStyle>
+            <a:lvl1pPr algn="l" defTabSz="914400" rtl="0" eaLnBrk="1" latinLnBrk="0" hangingPunct="1">
+              <a:lnSpc>
+                <a:spcPct val="90000"/>
+              </a:lnSpc>
+              <a:spcBef>
+                <a:spcPct val="0"/>
+              </a:spcBef>
+              <a:buNone/>
+              <a:defRPr sz="3600" kern="1200" cap="all" baseline="0">
+                <a:solidFill>
+                  <a:schemeClr val="tx1"/>
+                </a:solidFill>
+                <a:latin typeface="+mj-lt"/>
+                <a:ea typeface="+mj-ea"/>
+                <a:cs typeface="+mj-cs"/>
+              </a:defRPr>
+            </a:lvl1pPr>
+          </a:lstStyle>
+          <a:p>
+            <a:r>
+              <a:rPr lang="en-US"/>
+              <a:t>Solution</a:t>
+            </a:r>
+            <a:endParaRPr lang="en-US" dirty="0"/>
+          </a:p>
+        </p:txBody>
+      </p:sp>
+      <p:sp>
+        <p:nvSpPr>
+          <p:cNvPr id="5" name="Content Placeholder 2">
+            <a:extLst>
+              <a:ext uri="{FF2B5EF4-FFF2-40B4-BE49-F238E27FC236}">
+                <a16:creationId xmlns:a16="http://schemas.microsoft.com/office/drawing/2014/main" id="{76956CF1-FA6C-4F3B-8FCE-21EF63439D48}"/>
+              </a:ext>
+            </a:extLst>
+          </p:cNvPr>
+          <p:cNvSpPr txBox="1">
+            <a:spLocks/>
+          </p:cNvSpPr>
+          <p:nvPr/>
+        </p:nvSpPr>
+        <p:spPr>
+          <a:xfrm>
+            <a:off x="1284288" y="4689241"/>
+            <a:ext cx="9905999" cy="1312863"/>
+          </a:xfrm>
+          <a:prstGeom prst="rect">
+            <a:avLst/>
+          </a:prstGeom>
+        </p:spPr>
+        <p:txBody>
+          <a:bodyPr vert="horz" lIns="91440" tIns="45720" rIns="91440" bIns="45720" rtlCol="0">
+            <a:normAutofit lnSpcReduction="10000"/>
+          </a:bodyPr>
+          <a:lstStyle>
+            <a:lvl1pPr marL="228600" indent="-228600" algn="l" defTabSz="914400" rtl="0" eaLnBrk="1" latinLnBrk="0" hangingPunct="1">
+              <a:lnSpc>
+                <a:spcPct val="120000"/>
+              </a:lnSpc>
+              <a:spcBef>
+                <a:spcPts val="1000"/>
+              </a:spcBef>
+              <a:buSzPct val="125000"/>
+              <a:buFont typeface="Arial" panose="020B0604020202020204" pitchFamily="34" charset="0"/>
+              <a:buChar char="•"/>
+              <a:defRPr sz="2400" kern="1200">
+                <a:solidFill>
+                  <a:schemeClr val="tx1"/>
+                </a:solidFill>
+                <a:latin typeface="+mn-lt"/>
+                <a:ea typeface="+mn-ea"/>
+                <a:cs typeface="+mn-cs"/>
+              </a:defRPr>
+            </a:lvl1pPr>
+            <a:lvl2pPr marL="685800" indent="-228600" algn="l" defTabSz="914400" rtl="0" eaLnBrk="1" latinLnBrk="0" hangingPunct="1">
+              <a:lnSpc>
+                <a:spcPct val="120000"/>
+              </a:lnSpc>
+              <a:spcBef>
+                <a:spcPts val="500"/>
+              </a:spcBef>
+              <a:buSzPct val="125000"/>
+              <a:buFont typeface="Arial" panose="020B0604020202020204" pitchFamily="34" charset="0"/>
+              <a:buChar char="•"/>
+              <a:defRPr sz="2000" kern="1200">
+                <a:solidFill>
+                  <a:schemeClr val="tx1"/>
+                </a:solidFill>
+                <a:latin typeface="+mn-lt"/>
+                <a:ea typeface="+mn-ea"/>
+                <a:cs typeface="+mn-cs"/>
+              </a:defRPr>
+            </a:lvl2pPr>
+            <a:lvl3pPr marL="1143000" indent="-228600" algn="l" defTabSz="914400" rtl="0" eaLnBrk="1" latinLnBrk="0" hangingPunct="1">
+              <a:lnSpc>
+                <a:spcPct val="120000"/>
+              </a:lnSpc>
+              <a:spcBef>
+                <a:spcPts val="500"/>
+              </a:spcBef>
+              <a:buSzPct val="125000"/>
+              <a:buFont typeface="Arial" panose="020B0604020202020204" pitchFamily="34" charset="0"/>
+              <a:buChar char="•"/>
+              <a:defRPr sz="1800" kern="1200">
+                <a:solidFill>
+                  <a:schemeClr val="tx1"/>
+                </a:solidFill>
+                <a:latin typeface="+mn-lt"/>
+                <a:ea typeface="+mn-ea"/>
+                <a:cs typeface="+mn-cs"/>
+              </a:defRPr>
+            </a:lvl3pPr>
+            <a:lvl4pPr marL="1600200" indent="-228600" algn="l" defTabSz="914400" rtl="0" eaLnBrk="1" latinLnBrk="0" hangingPunct="1">
+              <a:lnSpc>
+                <a:spcPct val="120000"/>
+              </a:lnSpc>
+              <a:spcBef>
+                <a:spcPts val="500"/>
+              </a:spcBef>
+              <a:buSzPct val="125000"/>
+              <a:buFont typeface="Arial" panose="020B0604020202020204" pitchFamily="34" charset="0"/>
+              <a:buChar char="•"/>
+              <a:defRPr sz="1600" kern="1200">
+                <a:solidFill>
+                  <a:schemeClr val="tx1"/>
+                </a:solidFill>
+                <a:latin typeface="+mn-lt"/>
+                <a:ea typeface="+mn-ea"/>
+                <a:cs typeface="+mn-cs"/>
+              </a:defRPr>
+            </a:lvl4pPr>
+            <a:lvl5pPr marL="2057400" indent="-228600" algn="l" defTabSz="914400" rtl="0" eaLnBrk="1" latinLnBrk="0" hangingPunct="1">
+              <a:lnSpc>
+                <a:spcPct val="120000"/>
+              </a:lnSpc>
+              <a:spcBef>
+                <a:spcPts val="500"/>
+              </a:spcBef>
+              <a:buSzPct val="125000"/>
+              <a:buFont typeface="Arial" panose="020B0604020202020204" pitchFamily="34" charset="0"/>
+              <a:buChar char="•"/>
+              <a:defRPr sz="1600" kern="1200">
+                <a:solidFill>
+                  <a:schemeClr val="tx1"/>
+                </a:solidFill>
+                <a:latin typeface="+mn-lt"/>
+                <a:ea typeface="+mn-ea"/>
+                <a:cs typeface="+mn-cs"/>
+              </a:defRPr>
+            </a:lvl5pPr>
+            <a:lvl6pPr marL="2514600" indent="-228600" algn="l" defTabSz="914400" rtl="0" eaLnBrk="1" latinLnBrk="0" hangingPunct="1">
+              <a:lnSpc>
+                <a:spcPct val="120000"/>
+              </a:lnSpc>
+              <a:spcBef>
+                <a:spcPts val="500"/>
+              </a:spcBef>
+              <a:buSzPct val="125000"/>
+              <a:buFont typeface="Arial" panose="020B0604020202020204" pitchFamily="34" charset="0"/>
+              <a:buChar char="•"/>
+              <a:defRPr sz="1400" kern="1200">
+                <a:solidFill>
+                  <a:schemeClr val="tx1"/>
+                </a:solidFill>
+                <a:latin typeface="+mn-lt"/>
+                <a:ea typeface="+mn-ea"/>
+                <a:cs typeface="+mn-cs"/>
+              </a:defRPr>
+            </a:lvl6pPr>
+            <a:lvl7pPr marL="2971800" indent="-228600" algn="l" defTabSz="914400" rtl="0" eaLnBrk="1" latinLnBrk="0" hangingPunct="1">
+              <a:lnSpc>
+                <a:spcPct val="120000"/>
+              </a:lnSpc>
+              <a:spcBef>
+                <a:spcPts val="500"/>
+              </a:spcBef>
+              <a:buSzPct val="125000"/>
+              <a:buFont typeface="Arial" panose="020B0604020202020204" pitchFamily="34" charset="0"/>
+              <a:buChar char="•"/>
+              <a:defRPr sz="1400" kern="1200">
+                <a:solidFill>
+                  <a:schemeClr val="tx1"/>
+                </a:solidFill>
+                <a:latin typeface="+mn-lt"/>
+                <a:ea typeface="+mn-ea"/>
+                <a:cs typeface="+mn-cs"/>
+              </a:defRPr>
+            </a:lvl7pPr>
+            <a:lvl8pPr marL="3429000" indent="-228600" algn="l" defTabSz="914400" rtl="0" eaLnBrk="1" latinLnBrk="0" hangingPunct="1">
+              <a:lnSpc>
+                <a:spcPct val="120000"/>
+              </a:lnSpc>
+              <a:spcBef>
+                <a:spcPts val="500"/>
+              </a:spcBef>
+              <a:buSzPct val="125000"/>
+              <a:buFont typeface="Arial" panose="020B0604020202020204" pitchFamily="34" charset="0"/>
+              <a:buChar char="•"/>
+              <a:defRPr sz="1400" kern="1200">
+                <a:solidFill>
+                  <a:schemeClr val="tx1"/>
+                </a:solidFill>
+                <a:latin typeface="+mn-lt"/>
+                <a:ea typeface="+mn-ea"/>
+                <a:cs typeface="+mn-cs"/>
+              </a:defRPr>
+            </a:lvl8pPr>
+            <a:lvl9pPr marL="3886200" indent="-228600" algn="l" defTabSz="914400" rtl="0" eaLnBrk="1" latinLnBrk="0" hangingPunct="1">
+              <a:lnSpc>
+                <a:spcPct val="120000"/>
+              </a:lnSpc>
+              <a:spcBef>
+                <a:spcPts val="500"/>
+              </a:spcBef>
+              <a:buSzPct val="125000"/>
+              <a:buFont typeface="Arial" panose="020B0604020202020204" pitchFamily="34" charset="0"/>
+              <a:buChar char="•"/>
+              <a:defRPr sz="1400" kern="1200">
+                <a:solidFill>
+                  <a:schemeClr val="tx1"/>
+                </a:solidFill>
+                <a:latin typeface="+mn-lt"/>
+                <a:ea typeface="+mn-ea"/>
+                <a:cs typeface="+mn-cs"/>
+              </a:defRPr>
+            </a:lvl9pPr>
+          </a:lstStyle>
+          <a:p>
+            <a:r>
+              <a:rPr lang="en-US"/>
+              <a:t>For above problem statement IDS Api GateWay provides the solution by giving collabrated and identical credential rights with single secured Api Gateway</a:t>
+            </a:r>
+            <a:endParaRPr lang="en-US" dirty="0"/>
+          </a:p>
+        </p:txBody>
+      </p:sp>
+      <p:sp>
+        <p:nvSpPr>
+          <p:cNvPr id="73" name="Title 1">
+            <a:extLst>
+              <a:ext uri="{FF2B5EF4-FFF2-40B4-BE49-F238E27FC236}">
+                <a16:creationId xmlns:a16="http://schemas.microsoft.com/office/drawing/2014/main" id="{B1A46F24-65B1-4573-AA7F-31F6076E804A}"/>
+              </a:ext>
+            </a:extLst>
+          </p:cNvPr>
+          <p:cNvSpPr>
+            <a:spLocks noGrp="1"/>
+          </p:cNvSpPr>
+          <p:nvPr>
+            <p:ph type="title"/>
+          </p:nvPr>
+        </p:nvSpPr>
+        <p:spPr>
+          <a:xfrm>
+            <a:off x="1141413" y="619125"/>
+            <a:ext cx="9906000" cy="1477963"/>
           </a:xfrm>
         </p:spPr>
         <p:txBody>
@@ -12372,18 +14165,48 @@
           <a:lstStyle/>
           <a:p>
             <a:r>
-              <a:rPr lang="en-US" dirty="0"/>
-              <a:t>Secure login IDS</a:t>
+              <a:rPr lang="en-US" sz="4800" dirty="0"/>
+              <a:t>Problem Statement</a:t>
             </a:r>
           </a:p>
         </p:txBody>
       </p:sp>
+    </p:spTree>
+    <p:extLst>
+      <p:ext uri="{BB962C8B-B14F-4D97-AF65-F5344CB8AC3E}">
+        <p14:creationId xmlns:p14="http://schemas.microsoft.com/office/powerpoint/2010/main" val="1633232406"/>
+      </p:ext>
+    </p:extLst>
+  </p:cSld>
+  <p:clrMapOvr>
+    <a:masterClrMapping/>
+  </p:clrMapOvr>
+</p:sld>
+</file>
+
+<file path=ppt/slides/slide4.xml><?xml version="1.0" encoding="utf-8"?>
+<p:sld xmlns:a="http://schemas.openxmlformats.org/drawingml/2006/main" xmlns:r="http://schemas.openxmlformats.org/officeDocument/2006/relationships" xmlns:p="http://schemas.openxmlformats.org/presentationml/2006/main">
+  <p:cSld>
+    <p:spTree>
+      <p:nvGrpSpPr>
+        <p:cNvPr id="1" name=""/>
+        <p:cNvGrpSpPr/>
+        <p:nvPr/>
+      </p:nvGrpSpPr>
+      <p:grpSpPr>
+        <a:xfrm>
+          <a:off x="0" y="0"/>
+          <a:ext cx="0" cy="0"/>
+          <a:chOff x="0" y="0"/>
+          <a:chExt cx="0" cy="0"/>
+        </a:xfrm>
+      </p:grpSpPr>
       <p:sp>
         <p:nvSpPr>
-          <p:cNvPr id="3" name="Subtitle 2">
+          <p:cNvPr id="2" name="Title 1">
             <a:extLst>
               <a:ext uri="{FF2B5EF4-FFF2-40B4-BE49-F238E27FC236}">
-                <a16:creationId xmlns:a16="http://schemas.microsoft.com/office/drawing/2014/main" id="{8E921F5F-48A9-4E50-B008-C4266CDD7A5F}"/>
+                <a16:creationId xmlns:a16="http://schemas.microsoft.com/office/drawing/2014/main" id="{F8E7BC13-6B93-4A7D-AF19-C35FBE8F428D}"/>
               </a:ext>
             </a:extLst>
           </p:cNvPr>
@@ -12391,59 +14214,127 @@
             <a:spLocks noGrp="1"/>
           </p:cNvSpPr>
           <p:nvPr>
-            <p:ph type="subTitle" idx="1"/>
+            <p:ph type="title"/>
           </p:nvPr>
         </p:nvSpPr>
         <p:spPr>
           <a:xfrm>
-            <a:off x="1876424" y="3602037"/>
-            <a:ext cx="8791575" cy="2133599"/>
+            <a:off x="1046163" y="294667"/>
+            <a:ext cx="4335462" cy="772132"/>
+          </a:xfrm>
+        </p:spPr>
+        <p:txBody>
+          <a:bodyPr/>
+          <a:lstStyle/>
+          <a:p>
+            <a:r>
+              <a:rPr lang="en-US" dirty="0"/>
+              <a:t>Technology Stack </a:t>
+            </a:r>
+          </a:p>
+        </p:txBody>
+      </p:sp>
+      <p:sp>
+        <p:nvSpPr>
+          <p:cNvPr id="3" name="Content Placeholder 2">
+            <a:extLst>
+              <a:ext uri="{FF2B5EF4-FFF2-40B4-BE49-F238E27FC236}">
+                <a16:creationId xmlns:a16="http://schemas.microsoft.com/office/drawing/2014/main" id="{780149A2-7245-4282-A7F4-5783AF376EB0}"/>
+              </a:ext>
+            </a:extLst>
+          </p:cNvPr>
+          <p:cNvSpPr>
+            <a:spLocks noGrp="1"/>
+          </p:cNvSpPr>
+          <p:nvPr>
+            <p:ph idx="1"/>
+          </p:nvPr>
+        </p:nvSpPr>
+        <p:spPr>
+          <a:xfrm>
+            <a:off x="1143001" y="1066799"/>
+            <a:ext cx="7448549" cy="5057776"/>
           </a:xfrm>
         </p:spPr>
         <p:txBody>
           <a:bodyPr>
-            <a:normAutofit/>
+            <a:normAutofit fontScale="92500" lnSpcReduction="10000"/>
           </a:bodyPr>
           <a:lstStyle/>
           <a:p>
             <a:r>
-              <a:rPr lang="en-US" dirty="0"/>
-              <a:t>SUBMITED BY :</a:t>
-            </a:r>
-          </a:p>
-          <a:p>
-            <a:r>
-              <a:rPr lang="en-US" dirty="0"/>
-              <a:t>Prakash </a:t>
-            </a:r>
-            <a:r>
               <a:rPr lang="en-US" dirty="0" err="1"/>
-              <a:t>hb</a:t>
+              <a:t>DotNet</a:t>
             </a:r>
             <a:r>
               <a:rPr lang="en-US" dirty="0"/>
-              <a:t> Chinnappa</a:t>
+              <a:t> Core 5.0.1 Version (open source and cross platform)</a:t>
             </a:r>
           </a:p>
           <a:p>
-            <a:r>
-              <a:rPr lang="en-US" dirty="0" err="1"/>
-              <a:t>Shrinidhi</a:t>
-            </a:r>
             <a:r>
               <a:rPr lang="en-US" dirty="0"/>
-              <a:t> Joshi</a:t>
+              <a:t>WEB API project implemented </a:t>
             </a:r>
           </a:p>
           <a:p>
             <a:r>
-              <a:rPr lang="en-US" dirty="0" err="1"/>
-              <a:t>shashidhar</a:t>
+              <a:rPr lang="en-US" dirty="0"/>
+              <a:t>Swagger Integration </a:t>
             </a:r>
+          </a:p>
+          <a:p>
             <a:r>
-              <a:rPr lang="en-US"/>
-              <a:t> Jadhav	</a:t>
+              <a:rPr lang="en-US" dirty="0"/>
+              <a:t>Dapper ORM for connecting the Database</a:t>
             </a:r>
+          </a:p>
+          <a:p>
+            <a:r>
+              <a:rPr lang="en-US" dirty="0"/>
+              <a:t>SQL Server 2016</a:t>
+            </a:r>
+          </a:p>
+          <a:p>
+            <a:r>
+              <a:rPr lang="en-US" dirty="0"/>
+              <a:t>Bearer Token Integration</a:t>
+            </a:r>
+          </a:p>
+          <a:p>
+            <a:r>
+              <a:rPr lang="en-US" dirty="0"/>
+              <a:t>NodeJS 14.15.1</a:t>
+            </a:r>
+          </a:p>
+          <a:p>
+            <a:r>
+              <a:rPr lang="en-US" dirty="0"/>
+              <a:t>Angular 10</a:t>
+            </a:r>
+          </a:p>
+          <a:p>
+            <a:r>
+              <a:rPr lang="en-US" dirty="0"/>
+              <a:t>Bootstrap 4.5 </a:t>
+            </a:r>
+          </a:p>
+          <a:p>
+            <a:r>
+              <a:rPr lang="en-US" dirty="0"/>
+              <a:t>Visual studio Code IDE </a:t>
+            </a:r>
+          </a:p>
+          <a:p>
+            <a:pPr marL="0" indent="0">
+              <a:buNone/>
+            </a:pPr>
+            <a:endParaRPr lang="en-US" dirty="0"/>
+          </a:p>
+          <a:p>
+            <a:endParaRPr lang="en-US" dirty="0"/>
+          </a:p>
+          <a:p>
             <a:endParaRPr lang="en-US" dirty="0"/>
           </a:p>
           <a:p>
@@ -12454,7 +14345,307 @@
     </p:spTree>
     <p:extLst>
       <p:ext uri="{BB962C8B-B14F-4D97-AF65-F5344CB8AC3E}">
-        <p14:creationId xmlns:p14="http://schemas.microsoft.com/office/powerpoint/2010/main" val="69988641"/>
+        <p14:creationId xmlns:p14="http://schemas.microsoft.com/office/powerpoint/2010/main" val="2548875104"/>
+      </p:ext>
+    </p:extLst>
+  </p:cSld>
+  <p:clrMapOvr>
+    <a:masterClrMapping/>
+  </p:clrMapOvr>
+</p:sld>
+</file>
+
+<file path=ppt/slides/slide5.xml><?xml version="1.0" encoding="utf-8"?>
+<p:sld xmlns:a="http://schemas.openxmlformats.org/drawingml/2006/main" xmlns:r="http://schemas.openxmlformats.org/officeDocument/2006/relationships" xmlns:p="http://schemas.openxmlformats.org/presentationml/2006/main">
+  <p:cSld>
+    <p:spTree>
+      <p:nvGrpSpPr>
+        <p:cNvPr id="1" name=""/>
+        <p:cNvGrpSpPr/>
+        <p:nvPr/>
+      </p:nvGrpSpPr>
+      <p:grpSpPr>
+        <a:xfrm>
+          <a:off x="0" y="0"/>
+          <a:ext cx="0" cy="0"/>
+          <a:chOff x="0" y="0"/>
+          <a:chExt cx="0" cy="0"/>
+        </a:xfrm>
+      </p:grpSpPr>
+      <p:sp>
+        <p:nvSpPr>
+          <p:cNvPr id="2" name="Title 1">
+            <a:extLst>
+              <a:ext uri="{FF2B5EF4-FFF2-40B4-BE49-F238E27FC236}">
+                <a16:creationId xmlns:a16="http://schemas.microsoft.com/office/drawing/2014/main" id="{B86B80D5-34DD-4E53-92B8-3BF7CC23A159}"/>
+              </a:ext>
+            </a:extLst>
+          </p:cNvPr>
+          <p:cNvSpPr>
+            <a:spLocks noGrp="1"/>
+          </p:cNvSpPr>
+          <p:nvPr>
+            <p:ph type="title"/>
+          </p:nvPr>
+        </p:nvSpPr>
+        <p:spPr>
+          <a:xfrm>
+            <a:off x="1141412" y="161925"/>
+            <a:ext cx="5507038" cy="866775"/>
+          </a:xfrm>
+        </p:spPr>
+        <p:txBody>
+          <a:bodyPr/>
+          <a:lstStyle/>
+          <a:p>
+            <a:r>
+              <a:rPr lang="en-US" dirty="0"/>
+              <a:t>Project architecture</a:t>
+            </a:r>
+          </a:p>
+        </p:txBody>
+      </p:sp>
+      <p:pic>
+        <p:nvPicPr>
+          <p:cNvPr id="5" name="Picture 4" descr="Diagram&#10;&#10;Description automatically generated">
+            <a:extLst>
+              <a:ext uri="{FF2B5EF4-FFF2-40B4-BE49-F238E27FC236}">
+                <a16:creationId xmlns:a16="http://schemas.microsoft.com/office/drawing/2014/main" id="{B5479BBD-5209-4DE6-82B8-D9FE9029D9FD}"/>
+              </a:ext>
+            </a:extLst>
+          </p:cNvPr>
+          <p:cNvPicPr>
+            <a:picLocks noChangeAspect="1"/>
+          </p:cNvPicPr>
+          <p:nvPr/>
+        </p:nvPicPr>
+        <p:blipFill>
+          <a:blip r:embed="rId2"/>
+          <a:stretch>
+            <a:fillRect/>
+          </a:stretch>
+        </p:blipFill>
+        <p:spPr>
+          <a:xfrm>
+            <a:off x="1635760" y="873760"/>
+            <a:ext cx="9172368" cy="5863509"/>
+          </a:xfrm>
+          <a:prstGeom prst="rect">
+            <a:avLst/>
+          </a:prstGeom>
+        </p:spPr>
+      </p:pic>
+    </p:spTree>
+    <p:extLst>
+      <p:ext uri="{BB962C8B-B14F-4D97-AF65-F5344CB8AC3E}">
+        <p14:creationId xmlns:p14="http://schemas.microsoft.com/office/powerpoint/2010/main" val="354065282"/>
+      </p:ext>
+    </p:extLst>
+  </p:cSld>
+  <p:clrMapOvr>
+    <a:masterClrMapping/>
+  </p:clrMapOvr>
+</p:sld>
+</file>
+
+<file path=ppt/slides/slide6.xml><?xml version="1.0" encoding="utf-8"?>
+<p:sld xmlns:a="http://schemas.openxmlformats.org/drawingml/2006/main" xmlns:r="http://schemas.openxmlformats.org/officeDocument/2006/relationships" xmlns:p="http://schemas.openxmlformats.org/presentationml/2006/main">
+  <p:cSld>
+    <p:spTree>
+      <p:nvGrpSpPr>
+        <p:cNvPr id="1" name=""/>
+        <p:cNvGrpSpPr/>
+        <p:nvPr/>
+      </p:nvGrpSpPr>
+      <p:grpSpPr>
+        <a:xfrm>
+          <a:off x="0" y="0"/>
+          <a:ext cx="0" cy="0"/>
+          <a:chOff x="0" y="0"/>
+          <a:chExt cx="0" cy="0"/>
+        </a:xfrm>
+      </p:grpSpPr>
+      <p:pic>
+        <p:nvPicPr>
+          <p:cNvPr id="5" name="Picture 4" descr="Graphical user interface&#10;&#10;Description automatically generated">
+            <a:extLst>
+              <a:ext uri="{FF2B5EF4-FFF2-40B4-BE49-F238E27FC236}">
+                <a16:creationId xmlns:a16="http://schemas.microsoft.com/office/drawing/2014/main" id="{649C4DA7-140A-4AFE-873A-B4DEB8A8B754}"/>
+              </a:ext>
+            </a:extLst>
+          </p:cNvPr>
+          <p:cNvPicPr>
+            <a:picLocks noChangeAspect="1"/>
+          </p:cNvPicPr>
+          <p:nvPr/>
+        </p:nvPicPr>
+        <p:blipFill>
+          <a:blip r:embed="rId2"/>
+          <a:stretch>
+            <a:fillRect/>
+          </a:stretch>
+        </p:blipFill>
+        <p:spPr>
+          <a:xfrm>
+            <a:off x="1686560" y="1056639"/>
+            <a:ext cx="9073530" cy="5801359"/>
+          </a:xfrm>
+          <a:prstGeom prst="rect">
+            <a:avLst/>
+          </a:prstGeom>
+        </p:spPr>
+      </p:pic>
+    </p:spTree>
+    <p:extLst>
+      <p:ext uri="{BB962C8B-B14F-4D97-AF65-F5344CB8AC3E}">
+        <p14:creationId xmlns:p14="http://schemas.microsoft.com/office/powerpoint/2010/main" val="4126871664"/>
+      </p:ext>
+    </p:extLst>
+  </p:cSld>
+  <p:clrMapOvr>
+    <a:masterClrMapping/>
+  </p:clrMapOvr>
+</p:sld>
+</file>
+
+<file path=ppt/slides/slide7.xml><?xml version="1.0" encoding="utf-8"?>
+<p:sld xmlns:a="http://schemas.openxmlformats.org/drawingml/2006/main" xmlns:r="http://schemas.openxmlformats.org/officeDocument/2006/relationships" xmlns:p="http://schemas.openxmlformats.org/presentationml/2006/main">
+  <p:cSld>
+    <p:spTree>
+      <p:nvGrpSpPr>
+        <p:cNvPr id="1" name=""/>
+        <p:cNvGrpSpPr/>
+        <p:nvPr/>
+      </p:nvGrpSpPr>
+      <p:grpSpPr>
+        <a:xfrm>
+          <a:off x="0" y="0"/>
+          <a:ext cx="0" cy="0"/>
+          <a:chOff x="0" y="0"/>
+          <a:chExt cx="0" cy="0"/>
+        </a:xfrm>
+      </p:grpSpPr>
+      <p:sp>
+        <p:nvSpPr>
+          <p:cNvPr id="2" name="Title 1">
+            <a:extLst>
+              <a:ext uri="{FF2B5EF4-FFF2-40B4-BE49-F238E27FC236}">
+                <a16:creationId xmlns:a16="http://schemas.microsoft.com/office/drawing/2014/main" id="{B9ACEC20-A7FE-4B42-A526-DB0BB317E322}"/>
+              </a:ext>
+            </a:extLst>
+          </p:cNvPr>
+          <p:cNvSpPr>
+            <a:spLocks noGrp="1"/>
+          </p:cNvSpPr>
+          <p:nvPr>
+            <p:ph type="title"/>
+          </p:nvPr>
+        </p:nvSpPr>
+        <p:spPr/>
+        <p:txBody>
+          <a:bodyPr/>
+          <a:lstStyle/>
+          <a:p>
+            <a:r>
+              <a:rPr lang="en-US" dirty="0"/>
+              <a:t>Solution Demo </a:t>
+            </a:r>
+          </a:p>
+        </p:txBody>
+      </p:sp>
+      <p:sp>
+        <p:nvSpPr>
+          <p:cNvPr id="3" name="Content Placeholder 2">
+            <a:extLst>
+              <a:ext uri="{FF2B5EF4-FFF2-40B4-BE49-F238E27FC236}">
+                <a16:creationId xmlns:a16="http://schemas.microsoft.com/office/drawing/2014/main" id="{455E6581-4B5C-4C78-B596-1F918FC4B1F7}"/>
+              </a:ext>
+            </a:extLst>
+          </p:cNvPr>
+          <p:cNvSpPr>
+            <a:spLocks noGrp="1"/>
+          </p:cNvSpPr>
+          <p:nvPr>
+            <p:ph idx="1"/>
+          </p:nvPr>
+        </p:nvSpPr>
+        <p:spPr/>
+        <p:txBody>
+          <a:bodyPr/>
+          <a:lstStyle/>
+          <a:p>
+            <a:endParaRPr lang="en-US" dirty="0"/>
+          </a:p>
+        </p:txBody>
+      </p:sp>
+    </p:spTree>
+    <p:extLst>
+      <p:ext uri="{BB962C8B-B14F-4D97-AF65-F5344CB8AC3E}">
+        <p14:creationId xmlns:p14="http://schemas.microsoft.com/office/powerpoint/2010/main" val="945520589"/>
+      </p:ext>
+    </p:extLst>
+  </p:cSld>
+  <p:clrMapOvr>
+    <a:masterClrMapping/>
+  </p:clrMapOvr>
+</p:sld>
+</file>
+
+<file path=ppt/slides/slide8.xml><?xml version="1.0" encoding="utf-8"?>
+<p:sld xmlns:a="http://schemas.openxmlformats.org/drawingml/2006/main" xmlns:r="http://schemas.openxmlformats.org/officeDocument/2006/relationships" xmlns:p="http://schemas.openxmlformats.org/presentationml/2006/main">
+  <p:cSld>
+    <p:spTree>
+      <p:nvGrpSpPr>
+        <p:cNvPr id="1" name=""/>
+        <p:cNvGrpSpPr/>
+        <p:nvPr/>
+      </p:nvGrpSpPr>
+      <p:grpSpPr>
+        <a:xfrm>
+          <a:off x="0" y="0"/>
+          <a:ext cx="0" cy="0"/>
+          <a:chOff x="0" y="0"/>
+          <a:chExt cx="0" cy="0"/>
+        </a:xfrm>
+      </p:grpSpPr>
+      <p:sp>
+        <p:nvSpPr>
+          <p:cNvPr id="2" name="Title 1">
+            <a:extLst>
+              <a:ext uri="{FF2B5EF4-FFF2-40B4-BE49-F238E27FC236}">
+                <a16:creationId xmlns:a16="http://schemas.microsoft.com/office/drawing/2014/main" id="{0B874E15-29D5-493A-9715-DCA3578CA82D}"/>
+              </a:ext>
+            </a:extLst>
+          </p:cNvPr>
+          <p:cNvSpPr>
+            <a:spLocks noGrp="1"/>
+          </p:cNvSpPr>
+          <p:nvPr>
+            <p:ph type="title"/>
+          </p:nvPr>
+        </p:nvSpPr>
+        <p:spPr>
+          <a:xfrm>
+            <a:off x="1141413" y="618517"/>
+            <a:ext cx="9905998" cy="5248883"/>
+          </a:xfrm>
+        </p:spPr>
+        <p:txBody>
+          <a:bodyPr/>
+          <a:lstStyle/>
+          <a:p>
+            <a:pPr algn="ctr"/>
+            <a:r>
+              <a:rPr lang="en-US" dirty="0"/>
+              <a:t>Thank you</a:t>
+            </a:r>
+          </a:p>
+        </p:txBody>
+      </p:sp>
+    </p:spTree>
+    <p:extLst>
+      <p:ext uri="{BB962C8B-B14F-4D97-AF65-F5344CB8AC3E}">
+        <p14:creationId xmlns:p14="http://schemas.microsoft.com/office/powerpoint/2010/main" val="1622293497"/>
       </p:ext>
     </p:extLst>
   </p:cSld>

</xml_diff>